<commit_message>
Resource expressing_excessive_length_in_xmcf.pptx: Created "groups" for diagrams on slide 8.
</commit_message>
<xml_diff>
--- a/V3.1.1/resources/expressing_excessive_length_in_xmcf.pptx
+++ b/V3.1.1/resources/expressing_excessive_length_in_xmcf.pptx
@@ -21642,1916 +21642,1962 @@
           <a:chExt cx="0" cy="0"/>
         </a:xfrm>
       </p:grpSpPr>
-      <p:sp>
-        <p:nvSpPr>
-          <p:cNvPr id="34" name="Rectangle 33"/>
-          <p:cNvSpPr/>
-          <p:nvPr/>
-        </p:nvSpPr>
-        <p:spPr>
-          <a:xfrm>
-            <a:off x="5724128" y="4797152"/>
-            <a:ext cx="829752" cy="288032"/>
-          </a:xfrm>
-          <a:prstGeom prst="rect">
-            <a:avLst/>
-          </a:prstGeom>
-          <a:solidFill>
-            <a:schemeClr val="accent1">
-              <a:lumMod val="60000"/>
-              <a:lumOff val="40000"/>
-            </a:schemeClr>
-          </a:solidFill>
-          <a:ln>
+      <p:grpSp>
+        <p:nvGrpSpPr>
+          <p:cNvPr id="2" name="Gruppieren 1">
+            <a:extLst>
+              <a:ext uri="{FF2B5EF4-FFF2-40B4-BE49-F238E27FC236}">
+                <a16:creationId xmlns:a16="http://schemas.microsoft.com/office/drawing/2014/main" id="{F1FCC635-329C-F8CE-C533-D0E3717C96A6}"/>
+              </a:ext>
+            </a:extLst>
+          </p:cNvPr>
+          <p:cNvGrpSpPr>
+            <a:grpSpLocks noChangeAspect="1"/>
+          </p:cNvGrpSpPr>
+          <p:nvPr/>
+        </p:nvGrpSpPr>
+        <p:grpSpPr>
+          <a:xfrm>
+            <a:off x="70389" y="3789040"/>
+            <a:ext cx="9026949" cy="2592288"/>
+            <a:chOff x="70389" y="3789040"/>
+            <a:chExt cx="9026949" cy="2592288"/>
+          </a:xfrm>
+        </p:grpSpPr>
+        <p:sp>
+          <p:nvSpPr>
+            <p:cNvPr id="34" name="Rectangle 33"/>
+            <p:cNvSpPr/>
+            <p:nvPr/>
+          </p:nvSpPr>
+          <p:spPr>
+            <a:xfrm>
+              <a:off x="5724128" y="4797152"/>
+              <a:ext cx="829752" cy="288032"/>
+            </a:xfrm>
+            <a:prstGeom prst="rect">
+              <a:avLst/>
+            </a:prstGeom>
             <a:solidFill>
-              <a:schemeClr val="accent1"/>
+              <a:schemeClr val="accent1">
+                <a:lumMod val="60000"/>
+                <a:lumOff val="40000"/>
+              </a:schemeClr>
             </a:solidFill>
-          </a:ln>
-        </p:spPr>
-        <p:style>
-          <a:lnRef idx="2">
-            <a:schemeClr val="dk1">
-              <a:shade val="50000"/>
-            </a:schemeClr>
-          </a:lnRef>
-          <a:fillRef idx="1">
-            <a:schemeClr val="dk1"/>
-          </a:fillRef>
-          <a:effectRef idx="0">
-            <a:schemeClr val="dk1"/>
-          </a:effectRef>
-          <a:fontRef idx="minor">
-            <a:schemeClr val="lt1"/>
-          </a:fontRef>
-        </p:style>
-        <p:txBody>
-          <a:bodyPr rtlCol="0" anchor="ctr"/>
-          <a:lstStyle/>
-          <a:p>
-            <a:pPr algn="ctr"/>
-            <a:endParaRPr lang="en-US" sz="1200" dirty="0"/>
-          </a:p>
-        </p:txBody>
-      </p:sp>
-      <p:sp>
-        <p:nvSpPr>
-          <p:cNvPr id="35" name="Rectangle 34"/>
-          <p:cNvSpPr/>
-          <p:nvPr/>
-        </p:nvSpPr>
-        <p:spPr>
-          <a:xfrm>
-            <a:off x="3707904" y="4800890"/>
-            <a:ext cx="829752" cy="288032"/>
-          </a:xfrm>
-          <a:prstGeom prst="rect">
-            <a:avLst/>
-          </a:prstGeom>
-          <a:solidFill>
-            <a:schemeClr val="accent1">
-              <a:lumMod val="60000"/>
-              <a:lumOff val="40000"/>
-            </a:schemeClr>
-          </a:solidFill>
-          <a:ln>
+            <a:ln>
+              <a:solidFill>
+                <a:schemeClr val="accent1"/>
+              </a:solidFill>
+            </a:ln>
+          </p:spPr>
+          <p:style>
+            <a:lnRef idx="2">
+              <a:schemeClr val="dk1">
+                <a:shade val="50000"/>
+              </a:schemeClr>
+            </a:lnRef>
+            <a:fillRef idx="1">
+              <a:schemeClr val="dk1"/>
+            </a:fillRef>
+            <a:effectRef idx="0">
+              <a:schemeClr val="dk1"/>
+            </a:effectRef>
+            <a:fontRef idx="minor">
+              <a:schemeClr val="lt1"/>
+            </a:fontRef>
+          </p:style>
+          <p:txBody>
+            <a:bodyPr rtlCol="0" anchor="ctr"/>
+            <a:lstStyle/>
+            <a:p>
+              <a:pPr algn="ctr"/>
+              <a:endParaRPr lang="en-US" sz="1200" dirty="0"/>
+            </a:p>
+          </p:txBody>
+        </p:sp>
+        <p:sp>
+          <p:nvSpPr>
+            <p:cNvPr id="35" name="Rectangle 34"/>
+            <p:cNvSpPr/>
+            <p:nvPr/>
+          </p:nvSpPr>
+          <p:spPr>
+            <a:xfrm>
+              <a:off x="3707904" y="4800890"/>
+              <a:ext cx="829752" cy="288032"/>
+            </a:xfrm>
+            <a:prstGeom prst="rect">
+              <a:avLst/>
+            </a:prstGeom>
             <a:solidFill>
-              <a:schemeClr val="accent1"/>
+              <a:schemeClr val="accent1">
+                <a:lumMod val="60000"/>
+                <a:lumOff val="40000"/>
+              </a:schemeClr>
             </a:solidFill>
-          </a:ln>
-        </p:spPr>
-        <p:style>
-          <a:lnRef idx="2">
-            <a:schemeClr val="dk1">
-              <a:shade val="50000"/>
-            </a:schemeClr>
-          </a:lnRef>
-          <a:fillRef idx="1">
-            <a:schemeClr val="dk1"/>
-          </a:fillRef>
-          <a:effectRef idx="0">
-            <a:schemeClr val="dk1"/>
-          </a:effectRef>
-          <a:fontRef idx="minor">
-            <a:schemeClr val="lt1"/>
-          </a:fontRef>
-        </p:style>
-        <p:txBody>
-          <a:bodyPr rtlCol="0" anchor="ctr"/>
-          <a:lstStyle/>
-          <a:p>
-            <a:pPr algn="ctr"/>
-            <a:endParaRPr lang="en-US" sz="1200" dirty="0"/>
-          </a:p>
-        </p:txBody>
-      </p:sp>
-      <p:sp>
-        <p:nvSpPr>
-          <p:cNvPr id="36" name="Rectangle 35"/>
-          <p:cNvSpPr/>
-          <p:nvPr/>
-        </p:nvSpPr>
-        <p:spPr>
-          <a:xfrm>
-            <a:off x="1763688" y="4800096"/>
-            <a:ext cx="829752" cy="288032"/>
-          </a:xfrm>
-          <a:prstGeom prst="rect">
-            <a:avLst/>
-          </a:prstGeom>
-          <a:solidFill>
-            <a:schemeClr val="accent1">
-              <a:lumMod val="60000"/>
-              <a:lumOff val="40000"/>
-            </a:schemeClr>
-          </a:solidFill>
-          <a:ln>
+            <a:ln>
+              <a:solidFill>
+                <a:schemeClr val="accent1"/>
+              </a:solidFill>
+            </a:ln>
+          </p:spPr>
+          <p:style>
+            <a:lnRef idx="2">
+              <a:schemeClr val="dk1">
+                <a:shade val="50000"/>
+              </a:schemeClr>
+            </a:lnRef>
+            <a:fillRef idx="1">
+              <a:schemeClr val="dk1"/>
+            </a:fillRef>
+            <a:effectRef idx="0">
+              <a:schemeClr val="dk1"/>
+            </a:effectRef>
+            <a:fontRef idx="minor">
+              <a:schemeClr val="lt1"/>
+            </a:fontRef>
+          </p:style>
+          <p:txBody>
+            <a:bodyPr rtlCol="0" anchor="ctr"/>
+            <a:lstStyle/>
+            <a:p>
+              <a:pPr algn="ctr"/>
+              <a:endParaRPr lang="en-US" sz="1200" dirty="0"/>
+            </a:p>
+          </p:txBody>
+        </p:sp>
+        <p:sp>
+          <p:nvSpPr>
+            <p:cNvPr id="36" name="Rectangle 35"/>
+            <p:cNvSpPr/>
+            <p:nvPr/>
+          </p:nvSpPr>
+          <p:spPr>
+            <a:xfrm>
+              <a:off x="1763688" y="4800096"/>
+              <a:ext cx="829752" cy="288032"/>
+            </a:xfrm>
+            <a:prstGeom prst="rect">
+              <a:avLst/>
+            </a:prstGeom>
             <a:solidFill>
-              <a:schemeClr val="accent1"/>
+              <a:schemeClr val="accent1">
+                <a:lumMod val="60000"/>
+                <a:lumOff val="40000"/>
+              </a:schemeClr>
             </a:solidFill>
-          </a:ln>
-        </p:spPr>
-        <p:style>
-          <a:lnRef idx="2">
-            <a:schemeClr val="dk1">
-              <a:shade val="50000"/>
-            </a:schemeClr>
-          </a:lnRef>
-          <a:fillRef idx="1">
-            <a:schemeClr val="dk1"/>
-          </a:fillRef>
-          <a:effectRef idx="0">
-            <a:schemeClr val="dk1"/>
-          </a:effectRef>
-          <a:fontRef idx="minor">
-            <a:schemeClr val="lt1"/>
-          </a:fontRef>
-        </p:style>
-        <p:txBody>
-          <a:bodyPr rtlCol="0" anchor="ctr"/>
-          <a:lstStyle/>
-          <a:p>
-            <a:pPr algn="ctr"/>
-            <a:endParaRPr lang="en-US" sz="1200" dirty="0"/>
-          </a:p>
-        </p:txBody>
-      </p:sp>
-      <p:cxnSp>
-        <p:nvCxnSpPr>
-          <p:cNvPr id="41" name="Straight Connector 40"/>
-          <p:cNvCxnSpPr/>
-          <p:nvPr/>
-        </p:nvCxnSpPr>
-        <p:spPr>
-          <a:xfrm>
-            <a:off x="179512" y="5093180"/>
-            <a:ext cx="8712968" cy="0"/>
-          </a:xfrm>
-          <a:prstGeom prst="line">
-            <a:avLst/>
-          </a:prstGeom>
-          <a:ln>
-            <a:headEnd type="oval" w="med" len="med"/>
-            <a:tailEnd type="oval" w="med" len="med"/>
-          </a:ln>
-        </p:spPr>
-        <p:style>
-          <a:lnRef idx="2">
-            <a:schemeClr val="accent3"/>
-          </a:lnRef>
-          <a:fillRef idx="0">
-            <a:schemeClr val="accent3"/>
-          </a:fillRef>
-          <a:effectRef idx="1">
-            <a:schemeClr val="accent3"/>
-          </a:effectRef>
-          <a:fontRef idx="minor">
-            <a:schemeClr val="tx1"/>
-          </a:fontRef>
-        </p:style>
-      </p:cxnSp>
-      <p:cxnSp>
-        <p:nvCxnSpPr>
-          <p:cNvPr id="42" name="Straight Connector 41"/>
-          <p:cNvCxnSpPr/>
-          <p:nvPr/>
-        </p:nvCxnSpPr>
-        <p:spPr>
-          <a:xfrm>
-            <a:off x="179512" y="4371786"/>
-            <a:ext cx="0" cy="1296144"/>
-          </a:xfrm>
-          <a:prstGeom prst="line">
-            <a:avLst/>
-          </a:prstGeom>
-        </p:spPr>
-        <p:style>
-          <a:lnRef idx="1">
-            <a:schemeClr val="accent1"/>
-          </a:lnRef>
-          <a:fillRef idx="0">
-            <a:schemeClr val="accent1"/>
-          </a:fillRef>
-          <a:effectRef idx="0">
-            <a:schemeClr val="accent1"/>
-          </a:effectRef>
-          <a:fontRef idx="minor">
-            <a:schemeClr val="tx1"/>
-          </a:fontRef>
-        </p:style>
-      </p:cxnSp>
-      <p:cxnSp>
-        <p:nvCxnSpPr>
-          <p:cNvPr id="43" name="Straight Connector 42"/>
-          <p:cNvCxnSpPr/>
-          <p:nvPr/>
-        </p:nvCxnSpPr>
-        <p:spPr>
-          <a:xfrm>
-            <a:off x="8892480" y="4371786"/>
-            <a:ext cx="8700" cy="1296144"/>
-          </a:xfrm>
-          <a:prstGeom prst="line">
-            <a:avLst/>
-          </a:prstGeom>
-        </p:spPr>
-        <p:style>
-          <a:lnRef idx="1">
-            <a:schemeClr val="accent1"/>
-          </a:lnRef>
-          <a:fillRef idx="0">
-            <a:schemeClr val="accent1"/>
-          </a:fillRef>
-          <a:effectRef idx="0">
-            <a:schemeClr val="accent1"/>
-          </a:effectRef>
-          <a:fontRef idx="minor">
-            <a:schemeClr val="tx1"/>
-          </a:fontRef>
-        </p:style>
-      </p:cxnSp>
-      <p:cxnSp>
-        <p:nvCxnSpPr>
-          <p:cNvPr id="44" name="Straight Arrow Connector 43" title="dsfsdf"/>
-          <p:cNvCxnSpPr/>
-          <p:nvPr/>
-        </p:nvCxnSpPr>
-        <p:spPr>
-          <a:xfrm>
-            <a:off x="179512" y="5498991"/>
-            <a:ext cx="8712968" cy="0"/>
-          </a:xfrm>
-          <a:prstGeom prst="straightConnector1">
-            <a:avLst/>
-          </a:prstGeom>
-          <a:ln w="9525">
-            <a:solidFill>
+            <a:ln>
+              <a:solidFill>
+                <a:schemeClr val="accent1"/>
+              </a:solidFill>
+            </a:ln>
+          </p:spPr>
+          <p:style>
+            <a:lnRef idx="2">
+              <a:schemeClr val="dk1">
+                <a:shade val="50000"/>
+              </a:schemeClr>
+            </a:lnRef>
+            <a:fillRef idx="1">
+              <a:schemeClr val="dk1"/>
+            </a:fillRef>
+            <a:effectRef idx="0">
+              <a:schemeClr val="dk1"/>
+            </a:effectRef>
+            <a:fontRef idx="minor">
+              <a:schemeClr val="lt1"/>
+            </a:fontRef>
+          </p:style>
+          <p:txBody>
+            <a:bodyPr rtlCol="0" anchor="ctr"/>
+            <a:lstStyle/>
+            <a:p>
+              <a:pPr algn="ctr"/>
+              <a:endParaRPr lang="en-US" sz="1200" dirty="0"/>
+            </a:p>
+          </p:txBody>
+        </p:sp>
+        <p:cxnSp>
+          <p:nvCxnSpPr>
+            <p:cNvPr id="41" name="Straight Connector 40"/>
+            <p:cNvCxnSpPr/>
+            <p:nvPr/>
+          </p:nvCxnSpPr>
+          <p:spPr>
+            <a:xfrm>
+              <a:off x="179512" y="5093180"/>
+              <a:ext cx="8712968" cy="0"/>
+            </a:xfrm>
+            <a:prstGeom prst="line">
+              <a:avLst/>
+            </a:prstGeom>
+            <a:ln>
+              <a:headEnd type="oval" w="med" len="med"/>
+              <a:tailEnd type="oval" w="med" len="med"/>
+            </a:ln>
+          </p:spPr>
+          <p:style>
+            <a:lnRef idx="2">
+              <a:schemeClr val="accent3"/>
+            </a:lnRef>
+            <a:fillRef idx="0">
+              <a:schemeClr val="accent3"/>
+            </a:fillRef>
+            <a:effectRef idx="1">
+              <a:schemeClr val="accent3"/>
+            </a:effectRef>
+            <a:fontRef idx="minor">
               <a:schemeClr val="tx1"/>
-            </a:solidFill>
-            <a:prstDash val="sysDot"/>
-            <a:headEnd type="arrow" w="med" len="med"/>
-            <a:tailEnd type="arrow" w="med" len="med"/>
-          </a:ln>
-        </p:spPr>
-        <p:style>
-          <a:lnRef idx="1">
-            <a:schemeClr val="accent1"/>
-          </a:lnRef>
-          <a:fillRef idx="0">
-            <a:schemeClr val="accent1"/>
-          </a:fillRef>
-          <a:effectRef idx="0">
-            <a:schemeClr val="accent1"/>
-          </a:effectRef>
-          <a:fontRef idx="minor">
-            <a:schemeClr val="tx1"/>
-          </a:fontRef>
-        </p:style>
-      </p:cxnSp>
-      <p:sp>
-        <p:nvSpPr>
-          <p:cNvPr id="51" name="Rectangle 50"/>
-          <p:cNvSpPr/>
-          <p:nvPr/>
-        </p:nvSpPr>
-        <p:spPr>
-          <a:xfrm>
-            <a:off x="70389" y="3973323"/>
-            <a:ext cx="1668482" cy="360040"/>
-          </a:xfrm>
-          <a:prstGeom prst="rect">
-            <a:avLst/>
-          </a:prstGeom>
-          <a:solidFill>
-            <a:schemeClr val="bg1"/>
-          </a:solidFill>
-          <a:ln>
-            <a:noFill/>
-          </a:ln>
-        </p:spPr>
-        <p:style>
-          <a:lnRef idx="2">
-            <a:schemeClr val="dk1"/>
-          </a:lnRef>
-          <a:fillRef idx="1">
-            <a:schemeClr val="lt1"/>
-          </a:fillRef>
-          <a:effectRef idx="0">
-            <a:schemeClr val="dk1"/>
-          </a:effectRef>
-          <a:fontRef idx="minor">
-            <a:schemeClr val="dk1"/>
-          </a:fontRef>
-        </p:style>
-        <p:txBody>
-          <a:bodyPr lIns="0" rIns="0" rtlCol="0" anchor="ctr"/>
-          <a:lstStyle/>
-          <a:p>
-            <a:pPr algn="ctr"/>
-            <a:r>
-              <a:rPr lang="en-US" dirty="0"/>
-              <a:t>“first spacing”</a:t>
-            </a:r>
-          </a:p>
-        </p:txBody>
-      </p:sp>
-      <p:sp>
-        <p:nvSpPr>
-          <p:cNvPr id="52" name="Rectangle 51"/>
-          <p:cNvSpPr/>
-          <p:nvPr/>
-        </p:nvSpPr>
-        <p:spPr>
-          <a:xfrm>
-            <a:off x="3901330" y="5420301"/>
-            <a:ext cx="1341340" cy="168939"/>
-          </a:xfrm>
-          <a:prstGeom prst="rect">
-            <a:avLst/>
-          </a:prstGeom>
-          <a:solidFill>
-            <a:schemeClr val="bg1"/>
-          </a:solidFill>
-          <a:ln w="9525">
+            </a:fontRef>
+          </p:style>
+        </p:cxnSp>
+        <p:cxnSp>
+          <p:nvCxnSpPr>
+            <p:cNvPr id="42" name="Straight Connector 41"/>
+            <p:cNvCxnSpPr/>
+            <p:nvPr/>
+          </p:nvCxnSpPr>
+          <p:spPr>
+            <a:xfrm>
+              <a:off x="179512" y="4371786"/>
+              <a:ext cx="0" cy="1296144"/>
+            </a:xfrm>
+            <a:prstGeom prst="line">
+              <a:avLst/>
+            </a:prstGeom>
+          </p:spPr>
+          <p:style>
+            <a:lnRef idx="1">
+              <a:schemeClr val="accent1"/>
+            </a:lnRef>
+            <a:fillRef idx="0">
+              <a:schemeClr val="accent1"/>
+            </a:fillRef>
+            <a:effectRef idx="0">
+              <a:schemeClr val="accent1"/>
+            </a:effectRef>
+            <a:fontRef idx="minor">
+              <a:schemeClr val="tx1"/>
+            </a:fontRef>
+          </p:style>
+        </p:cxnSp>
+        <p:cxnSp>
+          <p:nvCxnSpPr>
+            <p:cNvPr id="43" name="Straight Connector 42"/>
+            <p:cNvCxnSpPr/>
+            <p:nvPr/>
+          </p:nvCxnSpPr>
+          <p:spPr>
+            <a:xfrm>
+              <a:off x="8892480" y="4371786"/>
+              <a:ext cx="8700" cy="1296144"/>
+            </a:xfrm>
+            <a:prstGeom prst="line">
+              <a:avLst/>
+            </a:prstGeom>
+          </p:spPr>
+          <p:style>
+            <a:lnRef idx="1">
+              <a:schemeClr val="accent1"/>
+            </a:lnRef>
+            <a:fillRef idx="0">
+              <a:schemeClr val="accent1"/>
+            </a:fillRef>
+            <a:effectRef idx="0">
+              <a:schemeClr val="accent1"/>
+            </a:effectRef>
+            <a:fontRef idx="minor">
+              <a:schemeClr val="tx1"/>
+            </a:fontRef>
+          </p:style>
+        </p:cxnSp>
+        <p:cxnSp>
+          <p:nvCxnSpPr>
+            <p:cNvPr id="44" name="Straight Arrow Connector 43" title="dsfsdf"/>
+            <p:cNvCxnSpPr/>
+            <p:nvPr/>
+          </p:nvCxnSpPr>
+          <p:spPr>
+            <a:xfrm>
+              <a:off x="179512" y="5498991"/>
+              <a:ext cx="8712968" cy="0"/>
+            </a:xfrm>
+            <a:prstGeom prst="straightConnector1">
+              <a:avLst/>
+            </a:prstGeom>
+            <a:ln w="9525">
+              <a:solidFill>
+                <a:schemeClr val="tx1"/>
+              </a:solidFill>
+              <a:prstDash val="sysDot"/>
+              <a:headEnd type="arrow" w="med" len="med"/>
+              <a:tailEnd type="arrow" w="med" len="med"/>
+            </a:ln>
+          </p:spPr>
+          <p:style>
+            <a:lnRef idx="1">
+              <a:schemeClr val="accent1"/>
+            </a:lnRef>
+            <a:fillRef idx="0">
+              <a:schemeClr val="accent1"/>
+            </a:fillRef>
+            <a:effectRef idx="0">
+              <a:schemeClr val="accent1"/>
+            </a:effectRef>
+            <a:fontRef idx="minor">
+              <a:schemeClr val="tx1"/>
+            </a:fontRef>
+          </p:style>
+        </p:cxnSp>
+        <p:sp>
+          <p:nvSpPr>
+            <p:cNvPr id="51" name="Rectangle 50"/>
+            <p:cNvSpPr/>
+            <p:nvPr/>
+          </p:nvSpPr>
+          <p:spPr>
+            <a:xfrm>
+              <a:off x="70389" y="3973323"/>
+              <a:ext cx="1668482" cy="360040"/>
+            </a:xfrm>
+            <a:prstGeom prst="rect">
+              <a:avLst/>
+            </a:prstGeom>
             <a:solidFill>
               <a:schemeClr val="bg1"/>
             </a:solidFill>
-            <a:prstDash val="sysDot"/>
-          </a:ln>
-        </p:spPr>
-        <p:style>
-          <a:lnRef idx="2">
-            <a:schemeClr val="accent1">
-              <a:shade val="50000"/>
-            </a:schemeClr>
-          </a:lnRef>
-          <a:fillRef idx="1">
-            <a:schemeClr val="accent1"/>
-          </a:fillRef>
-          <a:effectRef idx="0">
-            <a:schemeClr val="accent1"/>
-          </a:effectRef>
-          <a:fontRef idx="minor">
-            <a:schemeClr val="lt1"/>
-          </a:fontRef>
-        </p:style>
-        <p:txBody>
-          <a:bodyPr rtlCol="0" anchor="ctr"/>
-          <a:lstStyle/>
-          <a:p>
-            <a:pPr algn="ctr"/>
-            <a:r>
-              <a:rPr lang="en-US" sz="1400" dirty="0">
-                <a:solidFill>
-                  <a:schemeClr val="tx1"/>
-                </a:solidFill>
-              </a:rPr>
-              <a:t>total length</a:t>
-            </a:r>
-          </a:p>
-        </p:txBody>
-      </p:sp>
-      <p:sp>
-        <p:nvSpPr>
-          <p:cNvPr id="54" name="Right Brace 53"/>
-          <p:cNvSpPr/>
-          <p:nvPr/>
-        </p:nvSpPr>
-        <p:spPr>
-          <a:xfrm rot="16200000">
-            <a:off x="860310" y="3883699"/>
-            <a:ext cx="264310" cy="1562596"/>
-          </a:xfrm>
-          <a:prstGeom prst="rightBrace">
-            <a:avLst/>
-          </a:prstGeom>
-        </p:spPr>
-        <p:style>
-          <a:lnRef idx="1">
-            <a:schemeClr val="accent1"/>
-          </a:lnRef>
-          <a:fillRef idx="0">
-            <a:schemeClr val="accent1"/>
-          </a:fillRef>
-          <a:effectRef idx="0">
-            <a:schemeClr val="accent1"/>
-          </a:effectRef>
-          <a:fontRef idx="minor">
-            <a:schemeClr val="tx1"/>
-          </a:fontRef>
-        </p:style>
-        <p:txBody>
-          <a:bodyPr rtlCol="0" anchor="ctr"/>
-          <a:lstStyle/>
-          <a:p>
-            <a:pPr algn="ctr"/>
-            <a:endParaRPr lang="en-US"/>
-          </a:p>
-        </p:txBody>
-      </p:sp>
-      <p:sp>
-        <p:nvSpPr>
-          <p:cNvPr id="55" name="Rectangle 54"/>
-          <p:cNvSpPr/>
-          <p:nvPr/>
-        </p:nvSpPr>
-        <p:spPr>
-          <a:xfrm>
-            <a:off x="7740352" y="3973323"/>
-            <a:ext cx="1356986" cy="360040"/>
-          </a:xfrm>
-          <a:prstGeom prst="rect">
-            <a:avLst/>
-          </a:prstGeom>
-          <a:solidFill>
-            <a:schemeClr val="bg1"/>
-          </a:solidFill>
-          <a:ln>
-            <a:noFill/>
-          </a:ln>
-        </p:spPr>
-        <p:style>
-          <a:lnRef idx="2">
-            <a:schemeClr val="dk1"/>
-          </a:lnRef>
-          <a:fillRef idx="1">
-            <a:schemeClr val="lt1"/>
-          </a:fillRef>
-          <a:effectRef idx="0">
-            <a:schemeClr val="dk1"/>
-          </a:effectRef>
-          <a:fontRef idx="minor">
-            <a:schemeClr val="dk1"/>
-          </a:fontRef>
-        </p:style>
-        <p:txBody>
-          <a:bodyPr lIns="0" rIns="0" rtlCol="0" anchor="ctr"/>
-          <a:lstStyle/>
-          <a:p>
-            <a:pPr algn="ctr"/>
-            <a:r>
-              <a:rPr lang="en-US" dirty="0"/>
-              <a:t>“last spacing”</a:t>
-            </a:r>
-          </a:p>
-        </p:txBody>
-      </p:sp>
-      <p:sp>
-        <p:nvSpPr>
-          <p:cNvPr id="56" name="Right Brace 55"/>
-          <p:cNvSpPr/>
-          <p:nvPr/>
-        </p:nvSpPr>
-        <p:spPr>
-          <a:xfrm rot="16200000">
-            <a:off x="8527708" y="4469304"/>
-            <a:ext cx="264310" cy="398861"/>
-          </a:xfrm>
-          <a:prstGeom prst="rightBrace">
-            <a:avLst/>
-          </a:prstGeom>
-        </p:spPr>
-        <p:style>
-          <a:lnRef idx="1">
-            <a:schemeClr val="accent1"/>
-          </a:lnRef>
-          <a:fillRef idx="0">
-            <a:schemeClr val="accent1"/>
-          </a:fillRef>
-          <a:effectRef idx="0">
-            <a:schemeClr val="accent1"/>
-          </a:effectRef>
-          <a:fontRef idx="minor">
-            <a:schemeClr val="tx1"/>
-          </a:fontRef>
-        </p:style>
-        <p:txBody>
-          <a:bodyPr rtlCol="0" anchor="ctr"/>
-          <a:lstStyle/>
-          <a:p>
-            <a:pPr algn="ctr"/>
-            <a:endParaRPr lang="en-US"/>
-          </a:p>
-        </p:txBody>
-      </p:sp>
-      <p:sp>
-        <p:nvSpPr>
-          <p:cNvPr id="46" name="Rectangle 45"/>
-          <p:cNvSpPr/>
-          <p:nvPr/>
-        </p:nvSpPr>
-        <p:spPr>
-          <a:xfrm>
-            <a:off x="7630680" y="4792734"/>
-            <a:ext cx="829752" cy="288032"/>
-          </a:xfrm>
-          <a:prstGeom prst="rect">
-            <a:avLst/>
-          </a:prstGeom>
-          <a:solidFill>
-            <a:schemeClr val="accent1">
-              <a:lumMod val="60000"/>
-              <a:lumOff val="40000"/>
-            </a:schemeClr>
-          </a:solidFill>
-          <a:ln>
-            <a:solidFill>
-              <a:schemeClr val="accent1"/>
-            </a:solidFill>
-          </a:ln>
-        </p:spPr>
-        <p:style>
-          <a:lnRef idx="2">
-            <a:schemeClr val="dk1">
-              <a:shade val="50000"/>
-            </a:schemeClr>
-          </a:lnRef>
-          <a:fillRef idx="1">
-            <a:schemeClr val="dk1"/>
-          </a:fillRef>
-          <a:effectRef idx="0">
-            <a:schemeClr val="dk1"/>
-          </a:effectRef>
-          <a:fontRef idx="minor">
-            <a:schemeClr val="lt1"/>
-          </a:fontRef>
-        </p:style>
-        <p:txBody>
-          <a:bodyPr rtlCol="0" anchor="ctr"/>
-          <a:lstStyle/>
-          <a:p>
-            <a:pPr algn="ctr"/>
-            <a:endParaRPr lang="en-US" sz="1200" dirty="0"/>
-          </a:p>
-        </p:txBody>
-      </p:sp>
-      <p:cxnSp>
-        <p:nvCxnSpPr>
-          <p:cNvPr id="48" name="Straight Arrow Connector 47"/>
-          <p:cNvCxnSpPr>
-            <a:stCxn id="57" idx="2"/>
-          </p:cNvCxnSpPr>
-          <p:nvPr/>
-        </p:nvCxnSpPr>
-        <p:spPr>
-          <a:xfrm flipH="1">
-            <a:off x="3119431" y="3969060"/>
-            <a:ext cx="2568465" cy="845807"/>
-          </a:xfrm>
-          <a:prstGeom prst="straightConnector1">
-            <a:avLst/>
-          </a:prstGeom>
-          <a:ln>
-            <a:tailEnd type="arrow"/>
-          </a:ln>
-        </p:spPr>
-        <p:style>
-          <a:lnRef idx="1">
-            <a:schemeClr val="accent1"/>
-          </a:lnRef>
-          <a:fillRef idx="0">
-            <a:schemeClr val="accent1"/>
-          </a:fillRef>
-          <a:effectRef idx="0">
-            <a:schemeClr val="accent1"/>
-          </a:effectRef>
-          <a:fontRef idx="minor">
-            <a:schemeClr val="tx1"/>
-          </a:fontRef>
-        </p:style>
-      </p:cxnSp>
-      <p:cxnSp>
-        <p:nvCxnSpPr>
-          <p:cNvPr id="49" name="Straight Arrow Connector 48"/>
-          <p:cNvCxnSpPr>
-            <a:stCxn id="57" idx="3"/>
-          </p:cNvCxnSpPr>
-          <p:nvPr/>
-        </p:nvCxnSpPr>
-        <p:spPr>
-          <a:xfrm flipH="1">
-            <a:off x="5135655" y="3969060"/>
-            <a:ext cx="592782" cy="845807"/>
-          </a:xfrm>
-          <a:prstGeom prst="straightConnector1">
-            <a:avLst/>
-          </a:prstGeom>
-          <a:ln>
-            <a:tailEnd type="arrow"/>
-          </a:ln>
-        </p:spPr>
-        <p:style>
-          <a:lnRef idx="1">
-            <a:schemeClr val="accent1"/>
-          </a:lnRef>
-          <a:fillRef idx="0">
-            <a:schemeClr val="accent1"/>
-          </a:fillRef>
-          <a:effectRef idx="0">
-            <a:schemeClr val="accent1"/>
-          </a:effectRef>
-          <a:fontRef idx="minor">
-            <a:schemeClr val="tx1"/>
-          </a:fontRef>
-        </p:style>
-      </p:cxnSp>
-      <p:cxnSp>
-        <p:nvCxnSpPr>
-          <p:cNvPr id="50" name="Straight Arrow Connector 49"/>
-          <p:cNvCxnSpPr>
-            <a:stCxn id="57" idx="4"/>
-          </p:cNvCxnSpPr>
-          <p:nvPr/>
-        </p:nvCxnSpPr>
-        <p:spPr>
-          <a:xfrm>
-            <a:off x="5768977" y="3969060"/>
-            <a:ext cx="1310894" cy="841389"/>
-          </a:xfrm>
-          <a:prstGeom prst="straightConnector1">
-            <a:avLst/>
-          </a:prstGeom>
-          <a:ln>
-            <a:tailEnd type="arrow"/>
-          </a:ln>
-        </p:spPr>
-        <p:style>
-          <a:lnRef idx="1">
-            <a:schemeClr val="accent1"/>
-          </a:lnRef>
-          <a:fillRef idx="0">
-            <a:schemeClr val="accent1"/>
-          </a:fillRef>
-          <a:effectRef idx="0">
-            <a:schemeClr val="accent1"/>
-          </a:effectRef>
-          <a:fontRef idx="minor">
-            <a:schemeClr val="tx1"/>
-          </a:fontRef>
-        </p:style>
-      </p:cxnSp>
-      <p:sp>
-        <p:nvSpPr>
-          <p:cNvPr id="57" name="Isosceles Triangle 56"/>
-          <p:cNvSpPr/>
-          <p:nvPr/>
-        </p:nvSpPr>
-        <p:spPr>
-          <a:xfrm>
-            <a:off x="5687896" y="3897052"/>
-            <a:ext cx="81081" cy="72008"/>
-          </a:xfrm>
-          <a:prstGeom prst="triangle">
-            <a:avLst/>
-          </a:prstGeom>
-        </p:spPr>
-        <p:style>
-          <a:lnRef idx="2">
-            <a:schemeClr val="accent1">
-              <a:shade val="50000"/>
-            </a:schemeClr>
-          </a:lnRef>
-          <a:fillRef idx="1">
-            <a:schemeClr val="accent1"/>
-          </a:fillRef>
-          <a:effectRef idx="0">
-            <a:schemeClr val="accent1"/>
-          </a:effectRef>
-          <a:fontRef idx="minor">
-            <a:schemeClr val="lt1"/>
-          </a:fontRef>
-        </p:style>
-        <p:txBody>
-          <a:bodyPr rtlCol="0" anchor="ctr"/>
-          <a:lstStyle/>
-          <a:p>
-            <a:pPr algn="ctr"/>
-            <a:endParaRPr lang="en-US"/>
-          </a:p>
-        </p:txBody>
-      </p:sp>
-      <p:sp>
-        <p:nvSpPr>
-          <p:cNvPr id="58" name="Rectangle 57"/>
-          <p:cNvSpPr/>
-          <p:nvPr/>
-        </p:nvSpPr>
-        <p:spPr>
-          <a:xfrm>
-            <a:off x="4644008" y="3789040"/>
-            <a:ext cx="2168634" cy="360040"/>
-          </a:xfrm>
-          <a:prstGeom prst="rect">
-            <a:avLst/>
-          </a:prstGeom>
-          <a:solidFill>
-            <a:schemeClr val="bg1"/>
-          </a:solidFill>
-          <a:ln>
-            <a:noFill/>
-          </a:ln>
-        </p:spPr>
-        <p:style>
-          <a:lnRef idx="2">
-            <a:schemeClr val="dk1"/>
-          </a:lnRef>
-          <a:fillRef idx="1">
-            <a:schemeClr val="lt1"/>
-          </a:fillRef>
-          <a:effectRef idx="0">
-            <a:schemeClr val="dk1"/>
-          </a:effectRef>
-          <a:fontRef idx="minor">
-            <a:schemeClr val="dk1"/>
-          </a:fontRef>
-        </p:style>
-        <p:txBody>
-          <a:bodyPr rtlCol="0" anchor="ctr"/>
-          <a:lstStyle/>
-          <a:p>
-            <a:pPr algn="ctr"/>
-            <a:r>
-              <a:rPr lang="en-US" dirty="0"/>
-              <a:t>“spacing”</a:t>
-            </a:r>
-          </a:p>
-        </p:txBody>
-      </p:sp>
-      <p:cxnSp>
-        <p:nvCxnSpPr>
-          <p:cNvPr id="60" name="Straight Arrow Connector 59"/>
-          <p:cNvCxnSpPr>
-            <a:stCxn id="61" idx="5"/>
-            <a:endCxn id="46" idx="2"/>
-          </p:cNvCxnSpPr>
-          <p:nvPr/>
-        </p:nvCxnSpPr>
-        <p:spPr>
-          <a:xfrm flipV="1">
-            <a:off x="3804380" y="5080766"/>
-            <a:ext cx="4241176" cy="1084538"/>
-          </a:xfrm>
-          <a:prstGeom prst="straightConnector1">
-            <a:avLst/>
-          </a:prstGeom>
-          <a:ln>
-            <a:tailEnd type="arrow"/>
-          </a:ln>
-        </p:spPr>
-        <p:style>
-          <a:lnRef idx="1">
-            <a:schemeClr val="accent1"/>
-          </a:lnRef>
-          <a:fillRef idx="0">
-            <a:schemeClr val="accent1"/>
-          </a:fillRef>
-          <a:effectRef idx="0">
-            <a:schemeClr val="accent1"/>
-          </a:effectRef>
-          <a:fontRef idx="minor">
-            <a:schemeClr val="tx1"/>
-          </a:fontRef>
-        </p:style>
-      </p:cxnSp>
-      <p:sp>
-        <p:nvSpPr>
-          <p:cNvPr id="61" name="Isosceles Triangle 60"/>
-          <p:cNvSpPr/>
-          <p:nvPr/>
-        </p:nvSpPr>
-        <p:spPr>
-          <a:xfrm>
-            <a:off x="3743569" y="6129300"/>
-            <a:ext cx="81081" cy="72008"/>
-          </a:xfrm>
-          <a:prstGeom prst="triangle">
-            <a:avLst/>
-          </a:prstGeom>
-          <a:ln>
-            <a:solidFill>
-              <a:schemeClr val="tx1"/>
-            </a:solidFill>
-          </a:ln>
-        </p:spPr>
-        <p:style>
-          <a:lnRef idx="2">
-            <a:schemeClr val="accent1">
-              <a:shade val="50000"/>
-            </a:schemeClr>
-          </a:lnRef>
-          <a:fillRef idx="1">
-            <a:schemeClr val="accent1"/>
-          </a:fillRef>
-          <a:effectRef idx="0">
-            <a:schemeClr val="accent1"/>
-          </a:effectRef>
-          <a:fontRef idx="minor">
-            <a:schemeClr val="lt1"/>
-          </a:fontRef>
-        </p:style>
-        <p:txBody>
-          <a:bodyPr rtlCol="0" anchor="ctr"/>
-          <a:lstStyle/>
-          <a:p>
-            <a:pPr algn="ctr"/>
-            <a:endParaRPr lang="en-US"/>
-          </a:p>
-        </p:txBody>
-      </p:sp>
-      <p:cxnSp>
-        <p:nvCxnSpPr>
-          <p:cNvPr id="62" name="Straight Arrow Connector 61"/>
-          <p:cNvCxnSpPr>
-            <a:stCxn id="61" idx="1"/>
-            <a:endCxn id="34" idx="2"/>
-          </p:cNvCxnSpPr>
-          <p:nvPr/>
-        </p:nvCxnSpPr>
-        <p:spPr>
-          <a:xfrm flipV="1">
-            <a:off x="3763839" y="5085184"/>
-            <a:ext cx="2375165" cy="1080120"/>
-          </a:xfrm>
-          <a:prstGeom prst="straightConnector1">
-            <a:avLst/>
-          </a:prstGeom>
-          <a:ln>
-            <a:tailEnd type="arrow"/>
-          </a:ln>
-        </p:spPr>
-        <p:style>
-          <a:lnRef idx="1">
-            <a:schemeClr val="accent1"/>
-          </a:lnRef>
-          <a:fillRef idx="0">
-            <a:schemeClr val="accent1"/>
-          </a:fillRef>
-          <a:effectRef idx="0">
-            <a:schemeClr val="accent1"/>
-          </a:effectRef>
-          <a:fontRef idx="minor">
-            <a:schemeClr val="tx1"/>
-          </a:fontRef>
-        </p:style>
-      </p:cxnSp>
-      <p:cxnSp>
-        <p:nvCxnSpPr>
-          <p:cNvPr id="63" name="Straight Arrow Connector 62"/>
-          <p:cNvCxnSpPr>
-            <a:stCxn id="61" idx="1"/>
-            <a:endCxn id="35" idx="2"/>
-          </p:cNvCxnSpPr>
-          <p:nvPr/>
-        </p:nvCxnSpPr>
-        <p:spPr>
-          <a:xfrm flipV="1">
-            <a:off x="3763839" y="5088922"/>
-            <a:ext cx="358941" cy="1076382"/>
-          </a:xfrm>
-          <a:prstGeom prst="straightConnector1">
-            <a:avLst/>
-          </a:prstGeom>
-          <a:ln>
-            <a:tailEnd type="arrow"/>
-          </a:ln>
-        </p:spPr>
-        <p:style>
-          <a:lnRef idx="1">
-            <a:schemeClr val="accent1"/>
-          </a:lnRef>
-          <a:fillRef idx="0">
-            <a:schemeClr val="accent1"/>
-          </a:fillRef>
-          <a:effectRef idx="0">
-            <a:schemeClr val="accent1"/>
-          </a:effectRef>
-          <a:fontRef idx="minor">
-            <a:schemeClr val="tx1"/>
-          </a:fontRef>
-        </p:style>
-      </p:cxnSp>
-      <p:cxnSp>
-        <p:nvCxnSpPr>
-          <p:cNvPr id="33" name="Straight Arrow Connector 32"/>
-          <p:cNvCxnSpPr>
-            <a:stCxn id="61" idx="1"/>
-            <a:endCxn id="36" idx="2"/>
-          </p:cNvCxnSpPr>
-          <p:nvPr/>
-        </p:nvCxnSpPr>
-        <p:spPr>
-          <a:xfrm flipH="1" flipV="1">
-            <a:off x="2178564" y="5088128"/>
-            <a:ext cx="1585275" cy="1077176"/>
-          </a:xfrm>
-          <a:prstGeom prst="straightConnector1">
-            <a:avLst/>
-          </a:prstGeom>
-          <a:ln>
-            <a:tailEnd type="arrow"/>
-          </a:ln>
-        </p:spPr>
-        <p:style>
-          <a:lnRef idx="1">
-            <a:schemeClr val="accent1"/>
-          </a:lnRef>
-          <a:fillRef idx="0">
-            <a:schemeClr val="accent1"/>
-          </a:fillRef>
-          <a:effectRef idx="0">
-            <a:schemeClr val="accent1"/>
-          </a:effectRef>
-          <a:fontRef idx="minor">
-            <a:schemeClr val="tx1"/>
-          </a:fontRef>
-        </p:style>
-      </p:cxnSp>
-      <p:sp>
-        <p:nvSpPr>
-          <p:cNvPr id="71" name="Rectangle 70"/>
-          <p:cNvSpPr/>
-          <p:nvPr/>
-        </p:nvSpPr>
-        <p:spPr>
-          <a:xfrm>
-            <a:off x="2699792" y="6021288"/>
-            <a:ext cx="2168634" cy="360040"/>
-          </a:xfrm>
-          <a:prstGeom prst="rect">
-            <a:avLst/>
-          </a:prstGeom>
-          <a:solidFill>
-            <a:schemeClr val="bg1"/>
-          </a:solidFill>
-          <a:ln>
-            <a:noFill/>
-          </a:ln>
-        </p:spPr>
-        <p:style>
-          <a:lnRef idx="2">
-            <a:schemeClr val="dk1"/>
-          </a:lnRef>
-          <a:fillRef idx="1">
-            <a:schemeClr val="lt1"/>
-          </a:fillRef>
-          <a:effectRef idx="0">
-            <a:schemeClr val="dk1"/>
-          </a:effectRef>
-          <a:fontRef idx="minor">
-            <a:schemeClr val="dk1"/>
-          </a:fontRef>
-        </p:style>
-        <p:txBody>
-          <a:bodyPr rtlCol="0" anchor="ctr"/>
-          <a:lstStyle/>
-          <a:p>
-            <a:pPr algn="ctr"/>
-            <a:r>
-              <a:rPr lang="en-US" dirty="0"/>
-              <a:t>“length”</a:t>
-            </a:r>
-          </a:p>
-        </p:txBody>
-      </p:sp>
-      <p:sp>
-        <p:nvSpPr>
-          <p:cNvPr id="72" name="Rectangle 71"/>
-          <p:cNvSpPr/>
-          <p:nvPr/>
-        </p:nvSpPr>
-        <p:spPr>
-          <a:xfrm>
-            <a:off x="5796136" y="1196752"/>
-            <a:ext cx="829752" cy="288032"/>
-          </a:xfrm>
-          <a:prstGeom prst="rect">
-            <a:avLst/>
-          </a:prstGeom>
-          <a:solidFill>
-            <a:schemeClr val="accent1">
-              <a:lumMod val="60000"/>
-              <a:lumOff val="40000"/>
-            </a:schemeClr>
-          </a:solidFill>
-          <a:ln>
-            <a:solidFill>
-              <a:schemeClr val="accent1"/>
-            </a:solidFill>
-          </a:ln>
-        </p:spPr>
-        <p:style>
-          <a:lnRef idx="2">
-            <a:schemeClr val="dk1">
-              <a:shade val="50000"/>
-            </a:schemeClr>
-          </a:lnRef>
-          <a:fillRef idx="1">
-            <a:schemeClr val="dk1"/>
-          </a:fillRef>
-          <a:effectRef idx="0">
-            <a:schemeClr val="dk1"/>
-          </a:effectRef>
-          <a:fontRef idx="minor">
-            <a:schemeClr val="lt1"/>
-          </a:fontRef>
-        </p:style>
-        <p:txBody>
-          <a:bodyPr rtlCol="0" anchor="ctr"/>
-          <a:lstStyle/>
-          <a:p>
-            <a:pPr algn="ctr"/>
-            <a:r>
-              <a:rPr lang="en-US" sz="1600" i="1" dirty="0">
-                <a:latin typeface="Book Antiqua" panose="02040602050305030304" pitchFamily="18" charset="0"/>
-              </a:rPr>
-              <a:t>l</a:t>
-            </a:r>
-          </a:p>
-        </p:txBody>
-      </p:sp>
-      <p:sp>
-        <p:nvSpPr>
-          <p:cNvPr id="73" name="Rectangle 72"/>
-          <p:cNvSpPr/>
-          <p:nvPr/>
-        </p:nvSpPr>
-        <p:spPr>
-          <a:xfrm>
-            <a:off x="3779912" y="1200490"/>
-            <a:ext cx="829752" cy="288032"/>
-          </a:xfrm>
-          <a:prstGeom prst="rect">
-            <a:avLst/>
-          </a:prstGeom>
-          <a:solidFill>
-            <a:schemeClr val="accent1">
-              <a:lumMod val="60000"/>
-              <a:lumOff val="40000"/>
-            </a:schemeClr>
-          </a:solidFill>
-          <a:ln>
-            <a:solidFill>
-              <a:schemeClr val="accent1"/>
-            </a:solidFill>
-          </a:ln>
-        </p:spPr>
-        <p:style>
-          <a:lnRef idx="2">
-            <a:schemeClr val="dk1">
-              <a:shade val="50000"/>
-            </a:schemeClr>
-          </a:lnRef>
-          <a:fillRef idx="1">
-            <a:schemeClr val="dk1"/>
-          </a:fillRef>
-          <a:effectRef idx="0">
-            <a:schemeClr val="dk1"/>
-          </a:effectRef>
-          <a:fontRef idx="minor">
-            <a:schemeClr val="lt1"/>
-          </a:fontRef>
-        </p:style>
-        <p:txBody>
-          <a:bodyPr rtlCol="0" anchor="ctr"/>
-          <a:lstStyle/>
-          <a:p>
-            <a:pPr algn="ctr"/>
-            <a:r>
-              <a:rPr lang="en-US" sz="1600" i="1" dirty="0">
-                <a:latin typeface="Book Antiqua" panose="02040602050305030304" pitchFamily="18" charset="0"/>
-              </a:rPr>
-              <a:t>l</a:t>
-            </a:r>
-          </a:p>
-        </p:txBody>
-      </p:sp>
-      <p:sp>
-        <p:nvSpPr>
-          <p:cNvPr id="74" name="Rectangle 73"/>
-          <p:cNvSpPr/>
-          <p:nvPr/>
-        </p:nvSpPr>
-        <p:spPr>
-          <a:xfrm>
-            <a:off x="1835696" y="1199696"/>
-            <a:ext cx="829752" cy="288032"/>
-          </a:xfrm>
-          <a:prstGeom prst="rect">
-            <a:avLst/>
-          </a:prstGeom>
-          <a:solidFill>
-            <a:schemeClr val="accent1">
-              <a:lumMod val="60000"/>
-              <a:lumOff val="40000"/>
-            </a:schemeClr>
-          </a:solidFill>
-          <a:ln>
-            <a:solidFill>
-              <a:schemeClr val="accent1"/>
-            </a:solidFill>
-          </a:ln>
-        </p:spPr>
-        <p:style>
-          <a:lnRef idx="2">
-            <a:schemeClr val="dk1">
-              <a:shade val="50000"/>
-            </a:schemeClr>
-          </a:lnRef>
-          <a:fillRef idx="1">
-            <a:schemeClr val="dk1"/>
-          </a:fillRef>
-          <a:effectRef idx="0">
-            <a:schemeClr val="dk1"/>
-          </a:effectRef>
-          <a:fontRef idx="minor">
-            <a:schemeClr val="lt1"/>
-          </a:fontRef>
-        </p:style>
-        <p:txBody>
-          <a:bodyPr rtlCol="0" anchor="ctr"/>
-          <a:lstStyle/>
-          <a:p>
-            <a:pPr algn="ctr"/>
-            <a:r>
-              <a:rPr lang="en-US" sz="1600" i="1" dirty="0">
-                <a:latin typeface="Book Antiqua" panose="02040602050305030304" pitchFamily="18" charset="0"/>
-              </a:rPr>
-              <a:t>l</a:t>
-            </a:r>
-          </a:p>
-        </p:txBody>
-      </p:sp>
-      <p:cxnSp>
-        <p:nvCxnSpPr>
-          <p:cNvPr id="75" name="Straight Connector 74"/>
-          <p:cNvCxnSpPr/>
-          <p:nvPr/>
-        </p:nvCxnSpPr>
-        <p:spPr>
-          <a:xfrm>
-            <a:off x="251520" y="1492780"/>
-            <a:ext cx="8712968" cy="0"/>
-          </a:xfrm>
-          <a:prstGeom prst="line">
-            <a:avLst/>
-          </a:prstGeom>
-          <a:ln>
-            <a:headEnd type="oval" w="med" len="med"/>
-            <a:tailEnd type="oval" w="med" len="med"/>
-          </a:ln>
-        </p:spPr>
-        <p:style>
-          <a:lnRef idx="2">
-            <a:schemeClr val="accent3"/>
-          </a:lnRef>
-          <a:fillRef idx="0">
-            <a:schemeClr val="accent3"/>
-          </a:fillRef>
-          <a:effectRef idx="1">
-            <a:schemeClr val="accent3"/>
-          </a:effectRef>
-          <a:fontRef idx="minor">
-            <a:schemeClr val="tx1"/>
-          </a:fontRef>
-        </p:style>
-      </p:cxnSp>
-      <p:cxnSp>
-        <p:nvCxnSpPr>
-          <p:cNvPr id="76" name="Straight Connector 75"/>
-          <p:cNvCxnSpPr/>
-          <p:nvPr/>
-        </p:nvCxnSpPr>
-        <p:spPr>
-          <a:xfrm>
-            <a:off x="251520" y="771386"/>
-            <a:ext cx="0" cy="1296144"/>
-          </a:xfrm>
-          <a:prstGeom prst="line">
-            <a:avLst/>
-          </a:prstGeom>
-        </p:spPr>
-        <p:style>
-          <a:lnRef idx="1">
-            <a:schemeClr val="accent1"/>
-          </a:lnRef>
-          <a:fillRef idx="0">
-            <a:schemeClr val="accent1"/>
-          </a:fillRef>
-          <a:effectRef idx="0">
-            <a:schemeClr val="accent1"/>
-          </a:effectRef>
-          <a:fontRef idx="minor">
-            <a:schemeClr val="tx1"/>
-          </a:fontRef>
-        </p:style>
-      </p:cxnSp>
-      <p:cxnSp>
-        <p:nvCxnSpPr>
-          <p:cNvPr id="77" name="Straight Connector 76"/>
-          <p:cNvCxnSpPr/>
-          <p:nvPr/>
-        </p:nvCxnSpPr>
-        <p:spPr>
-          <a:xfrm>
-            <a:off x="8964488" y="771386"/>
-            <a:ext cx="8700" cy="1296144"/>
-          </a:xfrm>
-          <a:prstGeom prst="line">
-            <a:avLst/>
-          </a:prstGeom>
-        </p:spPr>
-        <p:style>
-          <a:lnRef idx="1">
-            <a:schemeClr val="accent1"/>
-          </a:lnRef>
-          <a:fillRef idx="0">
-            <a:schemeClr val="accent1"/>
-          </a:fillRef>
-          <a:effectRef idx="0">
-            <a:schemeClr val="accent1"/>
-          </a:effectRef>
-          <a:fontRef idx="minor">
-            <a:schemeClr val="tx1"/>
-          </a:fontRef>
-        </p:style>
-      </p:cxnSp>
-      <p:cxnSp>
-        <p:nvCxnSpPr>
-          <p:cNvPr id="78" name="Straight Arrow Connector 77" title="dsfsdf"/>
-          <p:cNvCxnSpPr/>
-          <p:nvPr/>
-        </p:nvCxnSpPr>
-        <p:spPr>
-          <a:xfrm>
-            <a:off x="251520" y="1898591"/>
-            <a:ext cx="8712968" cy="0"/>
-          </a:xfrm>
-          <a:prstGeom prst="straightConnector1">
-            <a:avLst/>
-          </a:prstGeom>
-          <a:ln w="9525">
-            <a:solidFill>
-              <a:schemeClr val="tx1"/>
-            </a:solidFill>
-            <a:prstDash val="sysDot"/>
-            <a:headEnd type="arrow" w="med" len="med"/>
-            <a:tailEnd type="arrow" w="med" len="med"/>
-          </a:ln>
-        </p:spPr>
-        <p:style>
-          <a:lnRef idx="1">
-            <a:schemeClr val="accent1"/>
-          </a:lnRef>
-          <a:fillRef idx="0">
-            <a:schemeClr val="accent1"/>
-          </a:fillRef>
-          <a:effectRef idx="0">
-            <a:schemeClr val="accent1"/>
-          </a:effectRef>
-          <a:fontRef idx="minor">
-            <a:schemeClr val="tx1"/>
-          </a:fontRef>
-        </p:style>
-      </p:cxnSp>
-      <p:sp>
-        <p:nvSpPr>
-          <p:cNvPr id="79" name="Rectangle 78"/>
-          <p:cNvSpPr/>
-          <p:nvPr/>
-        </p:nvSpPr>
-        <p:spPr>
-          <a:xfrm>
-            <a:off x="786899" y="764704"/>
-            <a:ext cx="647359" cy="360040"/>
-          </a:xfrm>
-          <a:prstGeom prst="rect">
-            <a:avLst/>
-          </a:prstGeom>
-          <a:solidFill>
-            <a:schemeClr val="bg1"/>
-          </a:solidFill>
-          <a:ln>
-            <a:noFill/>
-          </a:ln>
-        </p:spPr>
-        <p:style>
-          <a:lnRef idx="2">
-            <a:schemeClr val="dk1"/>
-          </a:lnRef>
-          <a:fillRef idx="1">
-            <a:schemeClr val="lt1"/>
-          </a:fillRef>
-          <a:effectRef idx="0">
-            <a:schemeClr val="dk1"/>
-          </a:effectRef>
-          <a:fontRef idx="minor">
-            <a:schemeClr val="dk1"/>
-          </a:fontRef>
-        </p:style>
-        <p:txBody>
-          <a:bodyPr rtlCol="0" anchor="ctr"/>
-          <a:lstStyle/>
-          <a:p>
-            <a:pPr algn="ctr"/>
-            <a:r>
-              <a:rPr lang="en-US" i="1" dirty="0" err="1">
-                <a:latin typeface="Book Antiqua" panose="02040602050305030304" pitchFamily="18" charset="0"/>
-              </a:rPr>
-              <a:t>m</a:t>
-            </a:r>
-            <a:r>
-              <a:rPr lang="en-US" i="1" baseline="-25000" dirty="0" err="1">
-                <a:latin typeface="Book Antiqua" panose="02040602050305030304" pitchFamily="18" charset="0"/>
-              </a:rPr>
-              <a:t>first</a:t>
-            </a:r>
-            <a:endParaRPr lang="en-US" i="1" baseline="-25000" dirty="0">
-              <a:latin typeface="Book Antiqua" panose="02040602050305030304" pitchFamily="18" charset="0"/>
-            </a:endParaRPr>
-          </a:p>
-        </p:txBody>
-      </p:sp>
-      <p:sp>
-        <p:nvSpPr>
-          <p:cNvPr id="80" name="Rectangle 79"/>
-          <p:cNvSpPr/>
-          <p:nvPr/>
-        </p:nvSpPr>
-        <p:spPr>
-          <a:xfrm>
-            <a:off x="3973338" y="1819901"/>
-            <a:ext cx="1341340" cy="168939"/>
-          </a:xfrm>
-          <a:prstGeom prst="rect">
-            <a:avLst/>
-          </a:prstGeom>
-          <a:solidFill>
-            <a:schemeClr val="bg1"/>
-          </a:solidFill>
-          <a:ln w="9525">
+            <a:ln>
+              <a:noFill/>
+            </a:ln>
+          </p:spPr>
+          <p:style>
+            <a:lnRef idx="2">
+              <a:schemeClr val="dk1"/>
+            </a:lnRef>
+            <a:fillRef idx="1">
+              <a:schemeClr val="lt1"/>
+            </a:fillRef>
+            <a:effectRef idx="0">
+              <a:schemeClr val="dk1"/>
+            </a:effectRef>
+            <a:fontRef idx="minor">
+              <a:schemeClr val="dk1"/>
+            </a:fontRef>
+          </p:style>
+          <p:txBody>
+            <a:bodyPr lIns="0" rIns="0" rtlCol="0" anchor="ctr"/>
+            <a:lstStyle/>
+            <a:p>
+              <a:pPr algn="ctr"/>
+              <a:r>
+                <a:rPr lang="en-US" dirty="0"/>
+                <a:t>“first spacing”</a:t>
+              </a:r>
+            </a:p>
+          </p:txBody>
+        </p:sp>
+        <p:sp>
+          <p:nvSpPr>
+            <p:cNvPr id="52" name="Rectangle 51"/>
+            <p:cNvSpPr/>
+            <p:nvPr/>
+          </p:nvSpPr>
+          <p:spPr>
+            <a:xfrm>
+              <a:off x="3901330" y="5420301"/>
+              <a:ext cx="1341340" cy="168939"/>
+            </a:xfrm>
+            <a:prstGeom prst="rect">
+              <a:avLst/>
+            </a:prstGeom>
             <a:solidFill>
               <a:schemeClr val="bg1"/>
             </a:solidFill>
-            <a:prstDash val="sysDot"/>
-          </a:ln>
-        </p:spPr>
-        <p:style>
-          <a:lnRef idx="2">
-            <a:schemeClr val="accent1">
-              <a:shade val="50000"/>
-            </a:schemeClr>
-          </a:lnRef>
-          <a:fillRef idx="1">
-            <a:schemeClr val="accent1"/>
-          </a:fillRef>
-          <a:effectRef idx="0">
-            <a:schemeClr val="accent1"/>
-          </a:effectRef>
-          <a:fontRef idx="minor">
-            <a:schemeClr val="lt1"/>
-          </a:fontRef>
-        </p:style>
-        <p:txBody>
-          <a:bodyPr rtlCol="0" anchor="ctr"/>
-          <a:lstStyle/>
-          <a:p>
-            <a:pPr algn="ctr"/>
-            <a:r>
-              <a:rPr lang="en-US" sz="2000" i="1" dirty="0" err="1">
+            <a:ln w="9525">
+              <a:solidFill>
+                <a:schemeClr val="bg1"/>
+              </a:solidFill>
+              <a:prstDash val="sysDot"/>
+            </a:ln>
+          </p:spPr>
+          <p:style>
+            <a:lnRef idx="2">
+              <a:schemeClr val="accent1">
+                <a:shade val="50000"/>
+              </a:schemeClr>
+            </a:lnRef>
+            <a:fillRef idx="1">
+              <a:schemeClr val="accent1"/>
+            </a:fillRef>
+            <a:effectRef idx="0">
+              <a:schemeClr val="accent1"/>
+            </a:effectRef>
+            <a:fontRef idx="minor">
+              <a:schemeClr val="lt1"/>
+            </a:fontRef>
+          </p:style>
+          <p:txBody>
+            <a:bodyPr rtlCol="0" anchor="ctr"/>
+            <a:lstStyle/>
+            <a:p>
+              <a:pPr algn="ctr"/>
+              <a:r>
+                <a:rPr lang="en-US" sz="1400" dirty="0">
+                  <a:solidFill>
+                    <a:schemeClr val="tx1"/>
+                  </a:solidFill>
+                </a:rPr>
+                <a:t>total length</a:t>
+              </a:r>
+            </a:p>
+          </p:txBody>
+        </p:sp>
+        <p:sp>
+          <p:nvSpPr>
+            <p:cNvPr id="54" name="Right Brace 53"/>
+            <p:cNvSpPr/>
+            <p:nvPr/>
+          </p:nvSpPr>
+          <p:spPr>
+            <a:xfrm rot="16200000">
+              <a:off x="860310" y="3883699"/>
+              <a:ext cx="264310" cy="1562596"/>
+            </a:xfrm>
+            <a:prstGeom prst="rightBrace">
+              <a:avLst/>
+            </a:prstGeom>
+          </p:spPr>
+          <p:style>
+            <a:lnRef idx="1">
+              <a:schemeClr val="accent1"/>
+            </a:lnRef>
+            <a:fillRef idx="0">
+              <a:schemeClr val="accent1"/>
+            </a:fillRef>
+            <a:effectRef idx="0">
+              <a:schemeClr val="accent1"/>
+            </a:effectRef>
+            <a:fontRef idx="minor">
+              <a:schemeClr val="tx1"/>
+            </a:fontRef>
+          </p:style>
+          <p:txBody>
+            <a:bodyPr rtlCol="0" anchor="ctr"/>
+            <a:lstStyle/>
+            <a:p>
+              <a:pPr algn="ctr"/>
+              <a:endParaRPr lang="en-US"/>
+            </a:p>
+          </p:txBody>
+        </p:sp>
+        <p:sp>
+          <p:nvSpPr>
+            <p:cNvPr id="55" name="Rectangle 54"/>
+            <p:cNvSpPr/>
+            <p:nvPr/>
+          </p:nvSpPr>
+          <p:spPr>
+            <a:xfrm>
+              <a:off x="7740352" y="3973323"/>
+              <a:ext cx="1356986" cy="360040"/>
+            </a:xfrm>
+            <a:prstGeom prst="rect">
+              <a:avLst/>
+            </a:prstGeom>
+            <a:solidFill>
+              <a:schemeClr val="bg1"/>
+            </a:solidFill>
+            <a:ln>
+              <a:noFill/>
+            </a:ln>
+          </p:spPr>
+          <p:style>
+            <a:lnRef idx="2">
+              <a:schemeClr val="dk1"/>
+            </a:lnRef>
+            <a:fillRef idx="1">
+              <a:schemeClr val="lt1"/>
+            </a:fillRef>
+            <a:effectRef idx="0">
+              <a:schemeClr val="dk1"/>
+            </a:effectRef>
+            <a:fontRef idx="minor">
+              <a:schemeClr val="dk1"/>
+            </a:fontRef>
+          </p:style>
+          <p:txBody>
+            <a:bodyPr lIns="0" rIns="0" rtlCol="0" anchor="ctr"/>
+            <a:lstStyle/>
+            <a:p>
+              <a:pPr algn="ctr"/>
+              <a:r>
+                <a:rPr lang="en-US" dirty="0"/>
+                <a:t>“last spacing”</a:t>
+              </a:r>
+            </a:p>
+          </p:txBody>
+        </p:sp>
+        <p:sp>
+          <p:nvSpPr>
+            <p:cNvPr id="56" name="Right Brace 55"/>
+            <p:cNvSpPr/>
+            <p:nvPr/>
+          </p:nvSpPr>
+          <p:spPr>
+            <a:xfrm rot="16200000">
+              <a:off x="8527708" y="4469304"/>
+              <a:ext cx="264310" cy="398861"/>
+            </a:xfrm>
+            <a:prstGeom prst="rightBrace">
+              <a:avLst/>
+            </a:prstGeom>
+          </p:spPr>
+          <p:style>
+            <a:lnRef idx="1">
+              <a:schemeClr val="accent1"/>
+            </a:lnRef>
+            <a:fillRef idx="0">
+              <a:schemeClr val="accent1"/>
+            </a:fillRef>
+            <a:effectRef idx="0">
+              <a:schemeClr val="accent1"/>
+            </a:effectRef>
+            <a:fontRef idx="minor">
+              <a:schemeClr val="tx1"/>
+            </a:fontRef>
+          </p:style>
+          <p:txBody>
+            <a:bodyPr rtlCol="0" anchor="ctr"/>
+            <a:lstStyle/>
+            <a:p>
+              <a:pPr algn="ctr"/>
+              <a:endParaRPr lang="en-US"/>
+            </a:p>
+          </p:txBody>
+        </p:sp>
+        <p:sp>
+          <p:nvSpPr>
+            <p:cNvPr id="46" name="Rectangle 45"/>
+            <p:cNvSpPr/>
+            <p:nvPr/>
+          </p:nvSpPr>
+          <p:spPr>
+            <a:xfrm>
+              <a:off x="7630680" y="4792734"/>
+              <a:ext cx="829752" cy="288032"/>
+            </a:xfrm>
+            <a:prstGeom prst="rect">
+              <a:avLst/>
+            </a:prstGeom>
+            <a:solidFill>
+              <a:schemeClr val="accent1">
+                <a:lumMod val="60000"/>
+                <a:lumOff val="40000"/>
+              </a:schemeClr>
+            </a:solidFill>
+            <a:ln>
+              <a:solidFill>
+                <a:schemeClr val="accent1"/>
+              </a:solidFill>
+            </a:ln>
+          </p:spPr>
+          <p:style>
+            <a:lnRef idx="2">
+              <a:schemeClr val="dk1">
+                <a:shade val="50000"/>
+              </a:schemeClr>
+            </a:lnRef>
+            <a:fillRef idx="1">
+              <a:schemeClr val="dk1"/>
+            </a:fillRef>
+            <a:effectRef idx="0">
+              <a:schemeClr val="dk1"/>
+            </a:effectRef>
+            <a:fontRef idx="minor">
+              <a:schemeClr val="lt1"/>
+            </a:fontRef>
+          </p:style>
+          <p:txBody>
+            <a:bodyPr rtlCol="0" anchor="ctr"/>
+            <a:lstStyle/>
+            <a:p>
+              <a:pPr algn="ctr"/>
+              <a:endParaRPr lang="en-US" sz="1200" dirty="0"/>
+            </a:p>
+          </p:txBody>
+        </p:sp>
+        <p:cxnSp>
+          <p:nvCxnSpPr>
+            <p:cNvPr id="48" name="Straight Arrow Connector 47"/>
+            <p:cNvCxnSpPr>
+              <a:stCxn id="57" idx="2"/>
+            </p:cNvCxnSpPr>
+            <p:nvPr/>
+          </p:nvCxnSpPr>
+          <p:spPr>
+            <a:xfrm flipH="1">
+              <a:off x="3119431" y="3969060"/>
+              <a:ext cx="2568465" cy="845807"/>
+            </a:xfrm>
+            <a:prstGeom prst="straightConnector1">
+              <a:avLst/>
+            </a:prstGeom>
+            <a:ln>
+              <a:tailEnd type="arrow"/>
+            </a:ln>
+          </p:spPr>
+          <p:style>
+            <a:lnRef idx="1">
+              <a:schemeClr val="accent1"/>
+            </a:lnRef>
+            <a:fillRef idx="0">
+              <a:schemeClr val="accent1"/>
+            </a:fillRef>
+            <a:effectRef idx="0">
+              <a:schemeClr val="accent1"/>
+            </a:effectRef>
+            <a:fontRef idx="minor">
+              <a:schemeClr val="tx1"/>
+            </a:fontRef>
+          </p:style>
+        </p:cxnSp>
+        <p:cxnSp>
+          <p:nvCxnSpPr>
+            <p:cNvPr id="49" name="Straight Arrow Connector 48"/>
+            <p:cNvCxnSpPr>
+              <a:stCxn id="57" idx="3"/>
+            </p:cNvCxnSpPr>
+            <p:nvPr/>
+          </p:nvCxnSpPr>
+          <p:spPr>
+            <a:xfrm flipH="1">
+              <a:off x="5135655" y="3969060"/>
+              <a:ext cx="592782" cy="845807"/>
+            </a:xfrm>
+            <a:prstGeom prst="straightConnector1">
+              <a:avLst/>
+            </a:prstGeom>
+            <a:ln>
+              <a:tailEnd type="arrow"/>
+            </a:ln>
+          </p:spPr>
+          <p:style>
+            <a:lnRef idx="1">
+              <a:schemeClr val="accent1"/>
+            </a:lnRef>
+            <a:fillRef idx="0">
+              <a:schemeClr val="accent1"/>
+            </a:fillRef>
+            <a:effectRef idx="0">
+              <a:schemeClr val="accent1"/>
+            </a:effectRef>
+            <a:fontRef idx="minor">
+              <a:schemeClr val="tx1"/>
+            </a:fontRef>
+          </p:style>
+        </p:cxnSp>
+        <p:cxnSp>
+          <p:nvCxnSpPr>
+            <p:cNvPr id="50" name="Straight Arrow Connector 49"/>
+            <p:cNvCxnSpPr>
+              <a:stCxn id="57" idx="4"/>
+            </p:cNvCxnSpPr>
+            <p:nvPr/>
+          </p:nvCxnSpPr>
+          <p:spPr>
+            <a:xfrm>
+              <a:off x="5768977" y="3969060"/>
+              <a:ext cx="1310894" cy="841389"/>
+            </a:xfrm>
+            <a:prstGeom prst="straightConnector1">
+              <a:avLst/>
+            </a:prstGeom>
+            <a:ln>
+              <a:tailEnd type="arrow"/>
+            </a:ln>
+          </p:spPr>
+          <p:style>
+            <a:lnRef idx="1">
+              <a:schemeClr val="accent1"/>
+            </a:lnRef>
+            <a:fillRef idx="0">
+              <a:schemeClr val="accent1"/>
+            </a:fillRef>
+            <a:effectRef idx="0">
+              <a:schemeClr val="accent1"/>
+            </a:effectRef>
+            <a:fontRef idx="minor">
+              <a:schemeClr val="tx1"/>
+            </a:fontRef>
+          </p:style>
+        </p:cxnSp>
+        <p:sp>
+          <p:nvSpPr>
+            <p:cNvPr id="57" name="Isosceles Triangle 56"/>
+            <p:cNvSpPr/>
+            <p:nvPr/>
+          </p:nvSpPr>
+          <p:spPr>
+            <a:xfrm>
+              <a:off x="5687896" y="3897052"/>
+              <a:ext cx="81081" cy="72008"/>
+            </a:xfrm>
+            <a:prstGeom prst="triangle">
+              <a:avLst/>
+            </a:prstGeom>
+          </p:spPr>
+          <p:style>
+            <a:lnRef idx="2">
+              <a:schemeClr val="accent1">
+                <a:shade val="50000"/>
+              </a:schemeClr>
+            </a:lnRef>
+            <a:fillRef idx="1">
+              <a:schemeClr val="accent1"/>
+            </a:fillRef>
+            <a:effectRef idx="0">
+              <a:schemeClr val="accent1"/>
+            </a:effectRef>
+            <a:fontRef idx="minor">
+              <a:schemeClr val="lt1"/>
+            </a:fontRef>
+          </p:style>
+          <p:txBody>
+            <a:bodyPr rtlCol="0" anchor="ctr"/>
+            <a:lstStyle/>
+            <a:p>
+              <a:pPr algn="ctr"/>
+              <a:endParaRPr lang="en-US"/>
+            </a:p>
+          </p:txBody>
+        </p:sp>
+        <p:sp>
+          <p:nvSpPr>
+            <p:cNvPr id="58" name="Rectangle 57"/>
+            <p:cNvSpPr/>
+            <p:nvPr/>
+          </p:nvSpPr>
+          <p:spPr>
+            <a:xfrm>
+              <a:off x="4644008" y="3789040"/>
+              <a:ext cx="2168634" cy="360040"/>
+            </a:xfrm>
+            <a:prstGeom prst="rect">
+              <a:avLst/>
+            </a:prstGeom>
+            <a:solidFill>
+              <a:schemeClr val="bg1"/>
+            </a:solidFill>
+            <a:ln>
+              <a:noFill/>
+            </a:ln>
+          </p:spPr>
+          <p:style>
+            <a:lnRef idx="2">
+              <a:schemeClr val="dk1"/>
+            </a:lnRef>
+            <a:fillRef idx="1">
+              <a:schemeClr val="lt1"/>
+            </a:fillRef>
+            <a:effectRef idx="0">
+              <a:schemeClr val="dk1"/>
+            </a:effectRef>
+            <a:fontRef idx="minor">
+              <a:schemeClr val="dk1"/>
+            </a:fontRef>
+          </p:style>
+          <p:txBody>
+            <a:bodyPr rtlCol="0" anchor="ctr"/>
+            <a:lstStyle/>
+            <a:p>
+              <a:pPr algn="ctr"/>
+              <a:r>
+                <a:rPr lang="en-US" dirty="0"/>
+                <a:t>“spacing”</a:t>
+              </a:r>
+            </a:p>
+          </p:txBody>
+        </p:sp>
+        <p:cxnSp>
+          <p:nvCxnSpPr>
+            <p:cNvPr id="60" name="Straight Arrow Connector 59"/>
+            <p:cNvCxnSpPr>
+              <a:stCxn id="61" idx="5"/>
+              <a:endCxn id="46" idx="2"/>
+            </p:cNvCxnSpPr>
+            <p:nvPr/>
+          </p:nvCxnSpPr>
+          <p:spPr>
+            <a:xfrm flipV="1">
+              <a:off x="3804380" y="5080766"/>
+              <a:ext cx="4241176" cy="1084538"/>
+            </a:xfrm>
+            <a:prstGeom prst="straightConnector1">
+              <a:avLst/>
+            </a:prstGeom>
+            <a:ln>
+              <a:tailEnd type="arrow"/>
+            </a:ln>
+          </p:spPr>
+          <p:style>
+            <a:lnRef idx="1">
+              <a:schemeClr val="accent1"/>
+            </a:lnRef>
+            <a:fillRef idx="0">
+              <a:schemeClr val="accent1"/>
+            </a:fillRef>
+            <a:effectRef idx="0">
+              <a:schemeClr val="accent1"/>
+            </a:effectRef>
+            <a:fontRef idx="minor">
+              <a:schemeClr val="tx1"/>
+            </a:fontRef>
+          </p:style>
+        </p:cxnSp>
+        <p:sp>
+          <p:nvSpPr>
+            <p:cNvPr id="61" name="Isosceles Triangle 60"/>
+            <p:cNvSpPr/>
+            <p:nvPr/>
+          </p:nvSpPr>
+          <p:spPr>
+            <a:xfrm>
+              <a:off x="3743569" y="6129300"/>
+              <a:ext cx="81081" cy="72008"/>
+            </a:xfrm>
+            <a:prstGeom prst="triangle">
+              <a:avLst/>
+            </a:prstGeom>
+            <a:ln>
+              <a:solidFill>
+                <a:schemeClr val="tx1"/>
+              </a:solidFill>
+            </a:ln>
+          </p:spPr>
+          <p:style>
+            <a:lnRef idx="2">
+              <a:schemeClr val="accent1">
+                <a:shade val="50000"/>
+              </a:schemeClr>
+            </a:lnRef>
+            <a:fillRef idx="1">
+              <a:schemeClr val="accent1"/>
+            </a:fillRef>
+            <a:effectRef idx="0">
+              <a:schemeClr val="accent1"/>
+            </a:effectRef>
+            <a:fontRef idx="minor">
+              <a:schemeClr val="lt1"/>
+            </a:fontRef>
+          </p:style>
+          <p:txBody>
+            <a:bodyPr rtlCol="0" anchor="ctr"/>
+            <a:lstStyle/>
+            <a:p>
+              <a:pPr algn="ctr"/>
+              <a:endParaRPr lang="en-US"/>
+            </a:p>
+          </p:txBody>
+        </p:sp>
+        <p:cxnSp>
+          <p:nvCxnSpPr>
+            <p:cNvPr id="62" name="Straight Arrow Connector 61"/>
+            <p:cNvCxnSpPr>
+              <a:stCxn id="61" idx="1"/>
+              <a:endCxn id="34" idx="2"/>
+            </p:cNvCxnSpPr>
+            <p:nvPr/>
+          </p:nvCxnSpPr>
+          <p:spPr>
+            <a:xfrm flipV="1">
+              <a:off x="3763839" y="5085184"/>
+              <a:ext cx="2375165" cy="1080120"/>
+            </a:xfrm>
+            <a:prstGeom prst="straightConnector1">
+              <a:avLst/>
+            </a:prstGeom>
+            <a:ln>
+              <a:tailEnd type="arrow"/>
+            </a:ln>
+          </p:spPr>
+          <p:style>
+            <a:lnRef idx="1">
+              <a:schemeClr val="accent1"/>
+            </a:lnRef>
+            <a:fillRef idx="0">
+              <a:schemeClr val="accent1"/>
+            </a:fillRef>
+            <a:effectRef idx="0">
+              <a:schemeClr val="accent1"/>
+            </a:effectRef>
+            <a:fontRef idx="minor">
+              <a:schemeClr val="tx1"/>
+            </a:fontRef>
+          </p:style>
+        </p:cxnSp>
+        <p:cxnSp>
+          <p:nvCxnSpPr>
+            <p:cNvPr id="63" name="Straight Arrow Connector 62"/>
+            <p:cNvCxnSpPr>
+              <a:stCxn id="61" idx="1"/>
+              <a:endCxn id="35" idx="2"/>
+            </p:cNvCxnSpPr>
+            <p:nvPr/>
+          </p:nvCxnSpPr>
+          <p:spPr>
+            <a:xfrm flipV="1">
+              <a:off x="3763839" y="5088922"/>
+              <a:ext cx="358941" cy="1076382"/>
+            </a:xfrm>
+            <a:prstGeom prst="straightConnector1">
+              <a:avLst/>
+            </a:prstGeom>
+            <a:ln>
+              <a:tailEnd type="arrow"/>
+            </a:ln>
+          </p:spPr>
+          <p:style>
+            <a:lnRef idx="1">
+              <a:schemeClr val="accent1"/>
+            </a:lnRef>
+            <a:fillRef idx="0">
+              <a:schemeClr val="accent1"/>
+            </a:fillRef>
+            <a:effectRef idx="0">
+              <a:schemeClr val="accent1"/>
+            </a:effectRef>
+            <a:fontRef idx="minor">
+              <a:schemeClr val="tx1"/>
+            </a:fontRef>
+          </p:style>
+        </p:cxnSp>
+        <p:cxnSp>
+          <p:nvCxnSpPr>
+            <p:cNvPr id="33" name="Straight Arrow Connector 32"/>
+            <p:cNvCxnSpPr>
+              <a:stCxn id="61" idx="1"/>
+              <a:endCxn id="36" idx="2"/>
+            </p:cNvCxnSpPr>
+            <p:nvPr/>
+          </p:nvCxnSpPr>
+          <p:spPr>
+            <a:xfrm flipH="1" flipV="1">
+              <a:off x="2178564" y="5088128"/>
+              <a:ext cx="1585275" cy="1077176"/>
+            </a:xfrm>
+            <a:prstGeom prst="straightConnector1">
+              <a:avLst/>
+            </a:prstGeom>
+            <a:ln>
+              <a:tailEnd type="arrow"/>
+            </a:ln>
+          </p:spPr>
+          <p:style>
+            <a:lnRef idx="1">
+              <a:schemeClr val="accent1"/>
+            </a:lnRef>
+            <a:fillRef idx="0">
+              <a:schemeClr val="accent1"/>
+            </a:fillRef>
+            <a:effectRef idx="0">
+              <a:schemeClr val="accent1"/>
+            </a:effectRef>
+            <a:fontRef idx="minor">
+              <a:schemeClr val="tx1"/>
+            </a:fontRef>
+          </p:style>
+        </p:cxnSp>
+        <p:sp>
+          <p:nvSpPr>
+            <p:cNvPr id="71" name="Rectangle 70"/>
+            <p:cNvSpPr/>
+            <p:nvPr/>
+          </p:nvSpPr>
+          <p:spPr>
+            <a:xfrm>
+              <a:off x="2699792" y="6021288"/>
+              <a:ext cx="2168634" cy="360040"/>
+            </a:xfrm>
+            <a:prstGeom prst="rect">
+              <a:avLst/>
+            </a:prstGeom>
+            <a:solidFill>
+              <a:schemeClr val="bg1"/>
+            </a:solidFill>
+            <a:ln>
+              <a:noFill/>
+            </a:ln>
+          </p:spPr>
+          <p:style>
+            <a:lnRef idx="2">
+              <a:schemeClr val="dk1"/>
+            </a:lnRef>
+            <a:fillRef idx="1">
+              <a:schemeClr val="lt1"/>
+            </a:fillRef>
+            <a:effectRef idx="0">
+              <a:schemeClr val="dk1"/>
+            </a:effectRef>
+            <a:fontRef idx="minor">
+              <a:schemeClr val="dk1"/>
+            </a:fontRef>
+          </p:style>
+          <p:txBody>
+            <a:bodyPr rtlCol="0" anchor="ctr"/>
+            <a:lstStyle/>
+            <a:p>
+              <a:pPr algn="ctr"/>
+              <a:r>
+                <a:rPr lang="en-US" dirty="0"/>
+                <a:t>“length”</a:t>
+              </a:r>
+            </a:p>
+          </p:txBody>
+        </p:sp>
+      </p:grpSp>
+      <p:grpSp>
+        <p:nvGrpSpPr>
+          <p:cNvPr id="3" name="Gruppieren 2">
+            <a:extLst>
+              <a:ext uri="{FF2B5EF4-FFF2-40B4-BE49-F238E27FC236}">
+                <a16:creationId xmlns:a16="http://schemas.microsoft.com/office/drawing/2014/main" id="{DE013F8F-341A-C702-4978-E7AA559E4308}"/>
+              </a:ext>
+            </a:extLst>
+          </p:cNvPr>
+          <p:cNvGrpSpPr>
+            <a:grpSpLocks noChangeAspect="1"/>
+          </p:cNvGrpSpPr>
+          <p:nvPr/>
+        </p:nvGrpSpPr>
+        <p:grpSpPr>
+          <a:xfrm>
+            <a:off x="251520" y="424689"/>
+            <a:ext cx="8868283" cy="1642841"/>
+            <a:chOff x="251520" y="424689"/>
+            <a:chExt cx="8868283" cy="1642841"/>
+          </a:xfrm>
+        </p:grpSpPr>
+        <p:sp>
+          <p:nvSpPr>
+            <p:cNvPr id="72" name="Rectangle 71"/>
+            <p:cNvSpPr/>
+            <p:nvPr/>
+          </p:nvSpPr>
+          <p:spPr>
+            <a:xfrm>
+              <a:off x="5796136" y="1196752"/>
+              <a:ext cx="829752" cy="288032"/>
+            </a:xfrm>
+            <a:prstGeom prst="rect">
+              <a:avLst/>
+            </a:prstGeom>
+            <a:solidFill>
+              <a:schemeClr val="accent1">
+                <a:lumMod val="60000"/>
+                <a:lumOff val="40000"/>
+              </a:schemeClr>
+            </a:solidFill>
+            <a:ln>
+              <a:solidFill>
+                <a:schemeClr val="accent1"/>
+              </a:solidFill>
+            </a:ln>
+          </p:spPr>
+          <p:style>
+            <a:lnRef idx="2">
+              <a:schemeClr val="dk1">
+                <a:shade val="50000"/>
+              </a:schemeClr>
+            </a:lnRef>
+            <a:fillRef idx="1">
+              <a:schemeClr val="dk1"/>
+            </a:fillRef>
+            <a:effectRef idx="0">
+              <a:schemeClr val="dk1"/>
+            </a:effectRef>
+            <a:fontRef idx="minor">
+              <a:schemeClr val="lt1"/>
+            </a:fontRef>
+          </p:style>
+          <p:txBody>
+            <a:bodyPr rtlCol="0" anchor="ctr"/>
+            <a:lstStyle/>
+            <a:p>
+              <a:pPr algn="ctr"/>
+              <a:r>
+                <a:rPr lang="en-US" sz="1600" i="1" dirty="0">
+                  <a:latin typeface="Book Antiqua" panose="02040602050305030304" pitchFamily="18" charset="0"/>
+                </a:rPr>
+                <a:t>l</a:t>
+              </a:r>
+            </a:p>
+          </p:txBody>
+        </p:sp>
+        <p:sp>
+          <p:nvSpPr>
+            <p:cNvPr id="73" name="Rectangle 72"/>
+            <p:cNvSpPr/>
+            <p:nvPr/>
+          </p:nvSpPr>
+          <p:spPr>
+            <a:xfrm>
+              <a:off x="3779912" y="1200490"/>
+              <a:ext cx="829752" cy="288032"/>
+            </a:xfrm>
+            <a:prstGeom prst="rect">
+              <a:avLst/>
+            </a:prstGeom>
+            <a:solidFill>
+              <a:schemeClr val="accent1">
+                <a:lumMod val="60000"/>
+                <a:lumOff val="40000"/>
+              </a:schemeClr>
+            </a:solidFill>
+            <a:ln>
+              <a:solidFill>
+                <a:schemeClr val="accent1"/>
+              </a:solidFill>
+            </a:ln>
+          </p:spPr>
+          <p:style>
+            <a:lnRef idx="2">
+              <a:schemeClr val="dk1">
+                <a:shade val="50000"/>
+              </a:schemeClr>
+            </a:lnRef>
+            <a:fillRef idx="1">
+              <a:schemeClr val="dk1"/>
+            </a:fillRef>
+            <a:effectRef idx="0">
+              <a:schemeClr val="dk1"/>
+            </a:effectRef>
+            <a:fontRef idx="minor">
+              <a:schemeClr val="lt1"/>
+            </a:fontRef>
+          </p:style>
+          <p:txBody>
+            <a:bodyPr rtlCol="0" anchor="ctr"/>
+            <a:lstStyle/>
+            <a:p>
+              <a:pPr algn="ctr"/>
+              <a:r>
+                <a:rPr lang="en-US" sz="1600" i="1" dirty="0">
+                  <a:latin typeface="Book Antiqua" panose="02040602050305030304" pitchFamily="18" charset="0"/>
+                </a:rPr>
+                <a:t>l</a:t>
+              </a:r>
+            </a:p>
+          </p:txBody>
+        </p:sp>
+        <p:sp>
+          <p:nvSpPr>
+            <p:cNvPr id="74" name="Rectangle 73"/>
+            <p:cNvSpPr/>
+            <p:nvPr/>
+          </p:nvSpPr>
+          <p:spPr>
+            <a:xfrm>
+              <a:off x="1835696" y="1199696"/>
+              <a:ext cx="829752" cy="288032"/>
+            </a:xfrm>
+            <a:prstGeom prst="rect">
+              <a:avLst/>
+            </a:prstGeom>
+            <a:solidFill>
+              <a:schemeClr val="accent1">
+                <a:lumMod val="60000"/>
+                <a:lumOff val="40000"/>
+              </a:schemeClr>
+            </a:solidFill>
+            <a:ln>
+              <a:solidFill>
+                <a:schemeClr val="accent1"/>
+              </a:solidFill>
+            </a:ln>
+          </p:spPr>
+          <p:style>
+            <a:lnRef idx="2">
+              <a:schemeClr val="dk1">
+                <a:shade val="50000"/>
+              </a:schemeClr>
+            </a:lnRef>
+            <a:fillRef idx="1">
+              <a:schemeClr val="dk1"/>
+            </a:fillRef>
+            <a:effectRef idx="0">
+              <a:schemeClr val="dk1"/>
+            </a:effectRef>
+            <a:fontRef idx="minor">
+              <a:schemeClr val="lt1"/>
+            </a:fontRef>
+          </p:style>
+          <p:txBody>
+            <a:bodyPr rtlCol="0" anchor="ctr"/>
+            <a:lstStyle/>
+            <a:p>
+              <a:pPr algn="ctr"/>
+              <a:r>
+                <a:rPr lang="en-US" sz="1600" i="1" dirty="0">
+                  <a:latin typeface="Book Antiqua" panose="02040602050305030304" pitchFamily="18" charset="0"/>
+                </a:rPr>
+                <a:t>l</a:t>
+              </a:r>
+            </a:p>
+          </p:txBody>
+        </p:sp>
+        <p:cxnSp>
+          <p:nvCxnSpPr>
+            <p:cNvPr id="75" name="Straight Connector 74"/>
+            <p:cNvCxnSpPr/>
+            <p:nvPr/>
+          </p:nvCxnSpPr>
+          <p:spPr>
+            <a:xfrm>
+              <a:off x="251520" y="1492780"/>
+              <a:ext cx="8712968" cy="0"/>
+            </a:xfrm>
+            <a:prstGeom prst="line">
+              <a:avLst/>
+            </a:prstGeom>
+            <a:ln>
+              <a:headEnd type="oval" w="med" len="med"/>
+              <a:tailEnd type="oval" w="med" len="med"/>
+            </a:ln>
+          </p:spPr>
+          <p:style>
+            <a:lnRef idx="2">
+              <a:schemeClr val="accent3"/>
+            </a:lnRef>
+            <a:fillRef idx="0">
+              <a:schemeClr val="accent3"/>
+            </a:fillRef>
+            <a:effectRef idx="1">
+              <a:schemeClr val="accent3"/>
+            </a:effectRef>
+            <a:fontRef idx="minor">
+              <a:schemeClr val="tx1"/>
+            </a:fontRef>
+          </p:style>
+        </p:cxnSp>
+        <p:cxnSp>
+          <p:nvCxnSpPr>
+            <p:cNvPr id="76" name="Straight Connector 75"/>
+            <p:cNvCxnSpPr/>
+            <p:nvPr/>
+          </p:nvCxnSpPr>
+          <p:spPr>
+            <a:xfrm>
+              <a:off x="251520" y="771386"/>
+              <a:ext cx="0" cy="1296144"/>
+            </a:xfrm>
+            <a:prstGeom prst="line">
+              <a:avLst/>
+            </a:prstGeom>
+          </p:spPr>
+          <p:style>
+            <a:lnRef idx="1">
+              <a:schemeClr val="accent1"/>
+            </a:lnRef>
+            <a:fillRef idx="0">
+              <a:schemeClr val="accent1"/>
+            </a:fillRef>
+            <a:effectRef idx="0">
+              <a:schemeClr val="accent1"/>
+            </a:effectRef>
+            <a:fontRef idx="minor">
+              <a:schemeClr val="tx1"/>
+            </a:fontRef>
+          </p:style>
+        </p:cxnSp>
+        <p:cxnSp>
+          <p:nvCxnSpPr>
+            <p:cNvPr id="77" name="Straight Connector 76"/>
+            <p:cNvCxnSpPr/>
+            <p:nvPr/>
+          </p:nvCxnSpPr>
+          <p:spPr>
+            <a:xfrm>
+              <a:off x="8964488" y="771386"/>
+              <a:ext cx="8700" cy="1296144"/>
+            </a:xfrm>
+            <a:prstGeom prst="line">
+              <a:avLst/>
+            </a:prstGeom>
+          </p:spPr>
+          <p:style>
+            <a:lnRef idx="1">
+              <a:schemeClr val="accent1"/>
+            </a:lnRef>
+            <a:fillRef idx="0">
+              <a:schemeClr val="accent1"/>
+            </a:fillRef>
+            <a:effectRef idx="0">
+              <a:schemeClr val="accent1"/>
+            </a:effectRef>
+            <a:fontRef idx="minor">
+              <a:schemeClr val="tx1"/>
+            </a:fontRef>
+          </p:style>
+        </p:cxnSp>
+        <p:cxnSp>
+          <p:nvCxnSpPr>
+            <p:cNvPr id="78" name="Straight Arrow Connector 77" title="dsfsdf"/>
+            <p:cNvCxnSpPr/>
+            <p:nvPr/>
+          </p:nvCxnSpPr>
+          <p:spPr>
+            <a:xfrm>
+              <a:off x="251520" y="1898591"/>
+              <a:ext cx="8712968" cy="0"/>
+            </a:xfrm>
+            <a:prstGeom prst="straightConnector1">
+              <a:avLst/>
+            </a:prstGeom>
+            <a:ln w="9525">
+              <a:solidFill>
+                <a:schemeClr val="tx1"/>
+              </a:solidFill>
+              <a:prstDash val="sysDot"/>
+              <a:headEnd type="arrow" w="med" len="med"/>
+              <a:tailEnd type="arrow" w="med" len="med"/>
+            </a:ln>
+          </p:spPr>
+          <p:style>
+            <a:lnRef idx="1">
+              <a:schemeClr val="accent1"/>
+            </a:lnRef>
+            <a:fillRef idx="0">
+              <a:schemeClr val="accent1"/>
+            </a:fillRef>
+            <a:effectRef idx="0">
+              <a:schemeClr val="accent1"/>
+            </a:effectRef>
+            <a:fontRef idx="minor">
+              <a:schemeClr val="tx1"/>
+            </a:fontRef>
+          </p:style>
+        </p:cxnSp>
+        <p:sp>
+          <p:nvSpPr>
+            <p:cNvPr id="79" name="Rectangle 78"/>
+            <p:cNvSpPr/>
+            <p:nvPr/>
+          </p:nvSpPr>
+          <p:spPr>
+            <a:xfrm>
+              <a:off x="786899" y="764704"/>
+              <a:ext cx="647359" cy="360040"/>
+            </a:xfrm>
+            <a:prstGeom prst="rect">
+              <a:avLst/>
+            </a:prstGeom>
+            <a:solidFill>
+              <a:schemeClr val="bg1"/>
+            </a:solidFill>
+            <a:ln>
+              <a:noFill/>
+            </a:ln>
+          </p:spPr>
+          <p:style>
+            <a:lnRef idx="2">
+              <a:schemeClr val="dk1"/>
+            </a:lnRef>
+            <a:fillRef idx="1">
+              <a:schemeClr val="lt1"/>
+            </a:fillRef>
+            <a:effectRef idx="0">
+              <a:schemeClr val="dk1"/>
+            </a:effectRef>
+            <a:fontRef idx="minor">
+              <a:schemeClr val="dk1"/>
+            </a:fontRef>
+          </p:style>
+          <p:txBody>
+            <a:bodyPr rtlCol="0" anchor="ctr"/>
+            <a:lstStyle/>
+            <a:p>
+              <a:pPr algn="ctr"/>
+              <a:r>
+                <a:rPr lang="en-US" i="1" dirty="0" err="1">
+                  <a:latin typeface="Book Antiqua" panose="02040602050305030304" pitchFamily="18" charset="0"/>
+                </a:rPr>
+                <a:t>m</a:t>
+              </a:r>
+              <a:r>
+                <a:rPr lang="en-US" i="1" baseline="-25000" dirty="0" err="1">
+                  <a:latin typeface="Book Antiqua" panose="02040602050305030304" pitchFamily="18" charset="0"/>
+                </a:rPr>
+                <a:t>first</a:t>
+              </a:r>
+              <a:endParaRPr lang="en-US" i="1" baseline="-25000" dirty="0">
+                <a:latin typeface="Book Antiqua" panose="02040602050305030304" pitchFamily="18" charset="0"/>
+              </a:endParaRPr>
+            </a:p>
+          </p:txBody>
+        </p:sp>
+        <p:sp>
+          <p:nvSpPr>
+            <p:cNvPr id="80" name="Rectangle 79"/>
+            <p:cNvSpPr/>
+            <p:nvPr/>
+          </p:nvSpPr>
+          <p:spPr>
+            <a:xfrm>
+              <a:off x="3973338" y="1819901"/>
+              <a:ext cx="1341340" cy="168939"/>
+            </a:xfrm>
+            <a:prstGeom prst="rect">
+              <a:avLst/>
+            </a:prstGeom>
+            <a:solidFill>
+              <a:schemeClr val="bg1"/>
+            </a:solidFill>
+            <a:ln w="9525">
+              <a:solidFill>
+                <a:schemeClr val="bg1"/>
+              </a:solidFill>
+              <a:prstDash val="sysDot"/>
+            </a:ln>
+          </p:spPr>
+          <p:style>
+            <a:lnRef idx="2">
+              <a:schemeClr val="accent1">
+                <a:shade val="50000"/>
+              </a:schemeClr>
+            </a:lnRef>
+            <a:fillRef idx="1">
+              <a:schemeClr val="accent1"/>
+            </a:fillRef>
+            <a:effectRef idx="0">
+              <a:schemeClr val="accent1"/>
+            </a:effectRef>
+            <a:fontRef idx="minor">
+              <a:schemeClr val="lt1"/>
+            </a:fontRef>
+          </p:style>
+          <p:txBody>
+            <a:bodyPr rtlCol="0" anchor="ctr"/>
+            <a:lstStyle/>
+            <a:p>
+              <a:pPr algn="ctr"/>
+              <a:r>
+                <a:rPr lang="en-US" sz="2000" i="1" dirty="0" err="1">
+                  <a:solidFill>
+                    <a:schemeClr val="tx1"/>
+                  </a:solidFill>
+                  <a:latin typeface="Book Antiqua" panose="02040602050305030304" pitchFamily="18" charset="0"/>
+                </a:rPr>
+                <a:t>L</a:t>
+              </a:r>
+              <a:r>
+                <a:rPr lang="en-US" sz="2000" i="1" baseline="-25000" dirty="0" err="1">
+                  <a:solidFill>
+                    <a:schemeClr val="tx1"/>
+                  </a:solidFill>
+                  <a:latin typeface="Book Antiqua" panose="02040602050305030304" pitchFamily="18" charset="0"/>
+                </a:rPr>
+                <a:t>total</a:t>
+              </a:r>
+              <a:endParaRPr lang="en-US" sz="2000" i="1" dirty="0">
                 <a:solidFill>
                   <a:schemeClr val="tx1"/>
                 </a:solidFill>
                 <a:latin typeface="Book Antiqua" panose="02040602050305030304" pitchFamily="18" charset="0"/>
-              </a:rPr>
-              <a:t>L</a:t>
-            </a:r>
-            <a:r>
-              <a:rPr lang="en-US" sz="2000" i="1" baseline="-25000" dirty="0" err="1">
-                <a:solidFill>
-                  <a:schemeClr val="tx1"/>
-                </a:solidFill>
+              </a:endParaRPr>
+            </a:p>
+          </p:txBody>
+        </p:sp>
+        <p:sp>
+          <p:nvSpPr>
+            <p:cNvPr id="81" name="Right Brace 80"/>
+            <p:cNvSpPr/>
+            <p:nvPr/>
+          </p:nvSpPr>
+          <p:spPr>
+            <a:xfrm rot="16200000">
+              <a:off x="901644" y="642358"/>
+              <a:ext cx="264310" cy="1420542"/>
+            </a:xfrm>
+            <a:prstGeom prst="rightBrace">
+              <a:avLst/>
+            </a:prstGeom>
+          </p:spPr>
+          <p:style>
+            <a:lnRef idx="1">
+              <a:schemeClr val="accent1"/>
+            </a:lnRef>
+            <a:fillRef idx="0">
+              <a:schemeClr val="accent1"/>
+            </a:fillRef>
+            <a:effectRef idx="0">
+              <a:schemeClr val="accent1"/>
+            </a:effectRef>
+            <a:fontRef idx="minor">
+              <a:schemeClr val="tx1"/>
+            </a:fontRef>
+          </p:style>
+          <p:txBody>
+            <a:bodyPr rtlCol="0" anchor="ctr"/>
+            <a:lstStyle/>
+            <a:p>
+              <a:pPr algn="ctr"/>
+              <a:endParaRPr lang="en-US" i="1">
                 <a:latin typeface="Book Antiqua" panose="02040602050305030304" pitchFamily="18" charset="0"/>
-              </a:rPr>
-              <a:t>total</a:t>
-            </a:r>
-            <a:endParaRPr lang="en-US" sz="2000" i="1" dirty="0">
+              </a:endParaRPr>
+            </a:p>
+          </p:txBody>
+        </p:sp>
+        <p:sp>
+          <p:nvSpPr>
+            <p:cNvPr id="82" name="Rectangle 81"/>
+            <p:cNvSpPr/>
+            <p:nvPr/>
+          </p:nvSpPr>
+          <p:spPr>
+            <a:xfrm>
+              <a:off x="8449134" y="794295"/>
+              <a:ext cx="670669" cy="341123"/>
+            </a:xfrm>
+            <a:prstGeom prst="rect">
+              <a:avLst/>
+            </a:prstGeom>
+            <a:solidFill>
+              <a:schemeClr val="bg1"/>
+            </a:solidFill>
+            <a:ln>
+              <a:noFill/>
+            </a:ln>
+          </p:spPr>
+          <p:style>
+            <a:lnRef idx="2">
+              <a:schemeClr val="dk1"/>
+            </a:lnRef>
+            <a:fillRef idx="1">
+              <a:schemeClr val="lt1"/>
+            </a:fillRef>
+            <a:effectRef idx="0">
+              <a:schemeClr val="dk1"/>
+            </a:effectRef>
+            <a:fontRef idx="minor">
+              <a:schemeClr val="dk1"/>
+            </a:fontRef>
+          </p:style>
+          <p:txBody>
+            <a:bodyPr rtlCol="0" anchor="ctr"/>
+            <a:lstStyle/>
+            <a:p>
+              <a:pPr algn="ctr"/>
+              <a:r>
+                <a:rPr lang="en-US" i="1" dirty="0" err="1">
+                  <a:latin typeface="Book Antiqua" panose="02040602050305030304" pitchFamily="18" charset="0"/>
+                </a:rPr>
+                <a:t>m</a:t>
+              </a:r>
+              <a:r>
+                <a:rPr lang="en-US" i="1" baseline="-25000" dirty="0" err="1">
+                  <a:latin typeface="Book Antiqua" panose="02040602050305030304" pitchFamily="18" charset="0"/>
+                </a:rPr>
+                <a:t>last</a:t>
+              </a:r>
+              <a:endParaRPr lang="en-US" i="1" baseline="-25000" dirty="0">
+                <a:latin typeface="Book Antiqua" panose="02040602050305030304" pitchFamily="18" charset="0"/>
+              </a:endParaRPr>
+            </a:p>
+          </p:txBody>
+        </p:sp>
+        <p:sp>
+          <p:nvSpPr>
+            <p:cNvPr id="83" name="Right Brace 82"/>
+            <p:cNvSpPr/>
+            <p:nvPr/>
+          </p:nvSpPr>
+          <p:spPr>
+            <a:xfrm rot="16200000">
+              <a:off x="8637112" y="1164089"/>
+              <a:ext cx="264310" cy="329637"/>
+            </a:xfrm>
+            <a:prstGeom prst="rightBrace">
+              <a:avLst/>
+            </a:prstGeom>
+          </p:spPr>
+          <p:style>
+            <a:lnRef idx="1">
+              <a:schemeClr val="accent1"/>
+            </a:lnRef>
+            <a:fillRef idx="0">
+              <a:schemeClr val="accent1"/>
+            </a:fillRef>
+            <a:effectRef idx="0">
+              <a:schemeClr val="accent1"/>
+            </a:effectRef>
+            <a:fontRef idx="minor">
+              <a:schemeClr val="tx1"/>
+            </a:fontRef>
+          </p:style>
+          <p:txBody>
+            <a:bodyPr rtlCol="0" anchor="ctr"/>
+            <a:lstStyle/>
+            <a:p>
+              <a:pPr algn="ctr"/>
+              <a:endParaRPr lang="en-US" i="1">
+                <a:latin typeface="Book Antiqua" panose="02040602050305030304" pitchFamily="18" charset="0"/>
+              </a:endParaRPr>
+            </a:p>
+          </p:txBody>
+        </p:sp>
+        <p:sp>
+          <p:nvSpPr>
+            <p:cNvPr id="84" name="Rectangle 83"/>
+            <p:cNvSpPr/>
+            <p:nvPr/>
+          </p:nvSpPr>
+          <p:spPr>
+            <a:xfrm>
+              <a:off x="7702688" y="1192334"/>
+              <a:ext cx="829752" cy="288032"/>
+            </a:xfrm>
+            <a:prstGeom prst="rect">
+              <a:avLst/>
+            </a:prstGeom>
+            <a:solidFill>
+              <a:schemeClr val="accent1">
+                <a:lumMod val="60000"/>
+                <a:lumOff val="40000"/>
+              </a:schemeClr>
+            </a:solidFill>
+            <a:ln>
+              <a:solidFill>
+                <a:schemeClr val="accent1"/>
+              </a:solidFill>
+            </a:ln>
+          </p:spPr>
+          <p:style>
+            <a:lnRef idx="2">
+              <a:schemeClr val="dk1">
+                <a:shade val="50000"/>
+              </a:schemeClr>
+            </a:lnRef>
+            <a:fillRef idx="1">
+              <a:schemeClr val="dk1"/>
+            </a:fillRef>
+            <a:effectRef idx="0">
+              <a:schemeClr val="dk1"/>
+            </a:effectRef>
+            <a:fontRef idx="minor">
+              <a:schemeClr val="lt1"/>
+            </a:fontRef>
+          </p:style>
+          <p:txBody>
+            <a:bodyPr rtlCol="0" anchor="ctr"/>
+            <a:lstStyle/>
+            <a:p>
+              <a:pPr algn="ctr"/>
+              <a:r>
+                <a:rPr lang="en-US" sz="1600" i="1" dirty="0">
+                  <a:latin typeface="Book Antiqua" panose="02040602050305030304" pitchFamily="18" charset="0"/>
+                </a:rPr>
+                <a:t>l</a:t>
+              </a:r>
+            </a:p>
+          </p:txBody>
+        </p:sp>
+        <p:sp>
+          <p:nvSpPr>
+            <p:cNvPr id="95" name="Rectangle 94"/>
+            <p:cNvSpPr/>
+            <p:nvPr/>
+          </p:nvSpPr>
+          <p:spPr>
+            <a:xfrm>
+              <a:off x="4951421" y="1156330"/>
+              <a:ext cx="519154" cy="360040"/>
+            </a:xfrm>
+            <a:prstGeom prst="rect">
+              <a:avLst/>
+            </a:prstGeom>
+            <a:noFill/>
+            <a:ln>
+              <a:noFill/>
+            </a:ln>
+          </p:spPr>
+          <p:style>
+            <a:lnRef idx="2">
+              <a:schemeClr val="dk1"/>
+            </a:lnRef>
+            <a:fillRef idx="1">
+              <a:schemeClr val="lt1"/>
+            </a:fillRef>
+            <a:effectRef idx="0">
+              <a:schemeClr val="dk1"/>
+            </a:effectRef>
+            <a:fontRef idx="minor">
+              <a:schemeClr val="dk1"/>
+            </a:fontRef>
+          </p:style>
+          <p:txBody>
+            <a:bodyPr rtlCol="0" anchor="ctr"/>
+            <a:lstStyle/>
+            <a:p>
+              <a:pPr algn="ctr"/>
+              <a:r>
+                <a:rPr lang="en-US" i="1" dirty="0">
+                  <a:latin typeface="Book Antiqua" panose="02040602050305030304" pitchFamily="18" charset="0"/>
+                </a:rPr>
+                <a:t>s</a:t>
+              </a:r>
+            </a:p>
+          </p:txBody>
+        </p:sp>
+        <p:sp>
+          <p:nvSpPr>
+            <p:cNvPr id="96" name="Rectangle 95"/>
+            <p:cNvSpPr/>
+            <p:nvPr/>
+          </p:nvSpPr>
+          <p:spPr>
+            <a:xfrm>
+              <a:off x="2971201" y="1156330"/>
+              <a:ext cx="519154" cy="360040"/>
+            </a:xfrm>
+            <a:prstGeom prst="rect">
+              <a:avLst/>
+            </a:prstGeom>
+            <a:noFill/>
+            <a:ln>
+              <a:noFill/>
+            </a:ln>
+          </p:spPr>
+          <p:style>
+            <a:lnRef idx="2">
+              <a:schemeClr val="dk1"/>
+            </a:lnRef>
+            <a:fillRef idx="1">
+              <a:schemeClr val="lt1"/>
+            </a:fillRef>
+            <a:effectRef idx="0">
+              <a:schemeClr val="dk1"/>
+            </a:effectRef>
+            <a:fontRef idx="minor">
+              <a:schemeClr val="dk1"/>
+            </a:fontRef>
+          </p:style>
+          <p:txBody>
+            <a:bodyPr rtlCol="0" anchor="ctr"/>
+            <a:lstStyle/>
+            <a:p>
+              <a:pPr algn="ctr"/>
+              <a:r>
+                <a:rPr lang="en-US" i="1" dirty="0">
+                  <a:latin typeface="Book Antiqua" panose="02040602050305030304" pitchFamily="18" charset="0"/>
+                </a:rPr>
+                <a:t>s</a:t>
+              </a:r>
+            </a:p>
+          </p:txBody>
+        </p:sp>
+        <p:sp>
+          <p:nvSpPr>
+            <p:cNvPr id="97" name="Rectangle 96"/>
+            <p:cNvSpPr/>
+            <p:nvPr/>
+          </p:nvSpPr>
+          <p:spPr>
+            <a:xfrm>
+              <a:off x="6948264" y="1156330"/>
+              <a:ext cx="519154" cy="360040"/>
+            </a:xfrm>
+            <a:prstGeom prst="rect">
+              <a:avLst/>
+            </a:prstGeom>
+            <a:noFill/>
+            <a:ln>
+              <a:noFill/>
+            </a:ln>
+          </p:spPr>
+          <p:style>
+            <a:lnRef idx="2">
+              <a:schemeClr val="dk1"/>
+            </a:lnRef>
+            <a:fillRef idx="1">
+              <a:schemeClr val="lt1"/>
+            </a:fillRef>
+            <a:effectRef idx="0">
+              <a:schemeClr val="dk1"/>
+            </a:effectRef>
+            <a:fontRef idx="minor">
+              <a:schemeClr val="dk1"/>
+            </a:fontRef>
+          </p:style>
+          <p:txBody>
+            <a:bodyPr rtlCol="0" anchor="ctr"/>
+            <a:lstStyle/>
+            <a:p>
+              <a:pPr algn="ctr"/>
+              <a:r>
+                <a:rPr lang="en-US" i="1" dirty="0">
+                  <a:latin typeface="Book Antiqua" panose="02040602050305030304" pitchFamily="18" charset="0"/>
+                </a:rPr>
+                <a:t>s</a:t>
+              </a:r>
+            </a:p>
+          </p:txBody>
+        </p:sp>
+        <p:cxnSp>
+          <p:nvCxnSpPr>
+            <p:cNvPr id="98" name="Straight Arrow Connector 97" title="dsfsdf"/>
+            <p:cNvCxnSpPr/>
+            <p:nvPr/>
+          </p:nvCxnSpPr>
+          <p:spPr>
+            <a:xfrm>
+              <a:off x="1851737" y="692696"/>
+              <a:ext cx="6624736" cy="0"/>
+            </a:xfrm>
+            <a:prstGeom prst="straightConnector1">
+              <a:avLst/>
+            </a:prstGeom>
+            <a:ln w="9525">
               <a:solidFill>
                 <a:schemeClr val="tx1"/>
               </a:solidFill>
-              <a:latin typeface="Book Antiqua" panose="02040602050305030304" pitchFamily="18" charset="0"/>
-            </a:endParaRPr>
-          </a:p>
-        </p:txBody>
-      </p:sp>
-      <p:sp>
-        <p:nvSpPr>
-          <p:cNvPr id="81" name="Right Brace 80"/>
-          <p:cNvSpPr/>
-          <p:nvPr/>
-        </p:nvSpPr>
-        <p:spPr>
-          <a:xfrm rot="16200000">
-            <a:off x="901644" y="642358"/>
-            <a:ext cx="264310" cy="1420542"/>
-          </a:xfrm>
-          <a:prstGeom prst="rightBrace">
-            <a:avLst/>
-          </a:prstGeom>
-        </p:spPr>
-        <p:style>
-          <a:lnRef idx="1">
-            <a:schemeClr val="accent1"/>
-          </a:lnRef>
-          <a:fillRef idx="0">
-            <a:schemeClr val="accent1"/>
-          </a:fillRef>
-          <a:effectRef idx="0">
-            <a:schemeClr val="accent1"/>
-          </a:effectRef>
-          <a:fontRef idx="minor">
-            <a:schemeClr val="tx1"/>
-          </a:fontRef>
-        </p:style>
-        <p:txBody>
-          <a:bodyPr rtlCol="0" anchor="ctr"/>
-          <a:lstStyle/>
-          <a:p>
-            <a:pPr algn="ctr"/>
-            <a:endParaRPr lang="en-US" i="1">
-              <a:latin typeface="Book Antiqua" panose="02040602050305030304" pitchFamily="18" charset="0"/>
-            </a:endParaRPr>
-          </a:p>
-        </p:txBody>
-      </p:sp>
-      <p:sp>
-        <p:nvSpPr>
-          <p:cNvPr id="82" name="Rectangle 81"/>
-          <p:cNvSpPr/>
-          <p:nvPr/>
-        </p:nvSpPr>
-        <p:spPr>
-          <a:xfrm>
-            <a:off x="8449134" y="794295"/>
-            <a:ext cx="670669" cy="341123"/>
-          </a:xfrm>
-          <a:prstGeom prst="rect">
-            <a:avLst/>
-          </a:prstGeom>
-          <a:solidFill>
-            <a:schemeClr val="bg1"/>
-          </a:solidFill>
-          <a:ln>
-            <a:noFill/>
-          </a:ln>
-        </p:spPr>
-        <p:style>
-          <a:lnRef idx="2">
-            <a:schemeClr val="dk1"/>
-          </a:lnRef>
-          <a:fillRef idx="1">
-            <a:schemeClr val="lt1"/>
-          </a:fillRef>
-          <a:effectRef idx="0">
-            <a:schemeClr val="dk1"/>
-          </a:effectRef>
-          <a:fontRef idx="minor">
-            <a:schemeClr val="dk1"/>
-          </a:fontRef>
-        </p:style>
-        <p:txBody>
-          <a:bodyPr rtlCol="0" anchor="ctr"/>
-          <a:lstStyle/>
-          <a:p>
-            <a:pPr algn="ctr"/>
-            <a:r>
-              <a:rPr lang="en-US" i="1" dirty="0" err="1">
-                <a:latin typeface="Book Antiqua" panose="02040602050305030304" pitchFamily="18" charset="0"/>
-              </a:rPr>
-              <a:t>m</a:t>
-            </a:r>
-            <a:r>
-              <a:rPr lang="en-US" i="1" baseline="-25000" dirty="0" err="1">
-                <a:latin typeface="Book Antiqua" panose="02040602050305030304" pitchFamily="18" charset="0"/>
-              </a:rPr>
-              <a:t>last</a:t>
-            </a:r>
-            <a:endParaRPr lang="en-US" i="1" baseline="-25000" dirty="0">
-              <a:latin typeface="Book Antiqua" panose="02040602050305030304" pitchFamily="18" charset="0"/>
-            </a:endParaRPr>
-          </a:p>
-        </p:txBody>
-      </p:sp>
-      <p:sp>
-        <p:nvSpPr>
-          <p:cNvPr id="83" name="Right Brace 82"/>
-          <p:cNvSpPr/>
-          <p:nvPr/>
-        </p:nvSpPr>
-        <p:spPr>
-          <a:xfrm rot="16200000">
-            <a:off x="8637112" y="1164089"/>
-            <a:ext cx="264310" cy="329637"/>
-          </a:xfrm>
-          <a:prstGeom prst="rightBrace">
-            <a:avLst/>
-          </a:prstGeom>
-        </p:spPr>
-        <p:style>
-          <a:lnRef idx="1">
-            <a:schemeClr val="accent1"/>
-          </a:lnRef>
-          <a:fillRef idx="0">
-            <a:schemeClr val="accent1"/>
-          </a:fillRef>
-          <a:effectRef idx="0">
-            <a:schemeClr val="accent1"/>
-          </a:effectRef>
-          <a:fontRef idx="minor">
-            <a:schemeClr val="tx1"/>
-          </a:fontRef>
-        </p:style>
-        <p:txBody>
-          <a:bodyPr rtlCol="0" anchor="ctr"/>
-          <a:lstStyle/>
-          <a:p>
-            <a:pPr algn="ctr"/>
-            <a:endParaRPr lang="en-US" i="1">
-              <a:latin typeface="Book Antiqua" panose="02040602050305030304" pitchFamily="18" charset="0"/>
-            </a:endParaRPr>
-          </a:p>
-        </p:txBody>
-      </p:sp>
-      <p:sp>
-        <p:nvSpPr>
-          <p:cNvPr id="84" name="Rectangle 83"/>
-          <p:cNvSpPr/>
-          <p:nvPr/>
-        </p:nvSpPr>
-        <p:spPr>
-          <a:xfrm>
-            <a:off x="7702688" y="1192334"/>
-            <a:ext cx="829752" cy="288032"/>
-          </a:xfrm>
-          <a:prstGeom prst="rect">
-            <a:avLst/>
-          </a:prstGeom>
-          <a:solidFill>
-            <a:schemeClr val="accent1">
-              <a:lumMod val="60000"/>
-              <a:lumOff val="40000"/>
-            </a:schemeClr>
-          </a:solidFill>
-          <a:ln>
-            <a:solidFill>
-              <a:schemeClr val="accent1"/>
-            </a:solidFill>
-          </a:ln>
-        </p:spPr>
-        <p:style>
-          <a:lnRef idx="2">
-            <a:schemeClr val="dk1">
-              <a:shade val="50000"/>
-            </a:schemeClr>
-          </a:lnRef>
-          <a:fillRef idx="1">
-            <a:schemeClr val="dk1"/>
-          </a:fillRef>
-          <a:effectRef idx="0">
-            <a:schemeClr val="dk1"/>
-          </a:effectRef>
-          <a:fontRef idx="minor">
-            <a:schemeClr val="lt1"/>
-          </a:fontRef>
-        </p:style>
-        <p:txBody>
-          <a:bodyPr rtlCol="0" anchor="ctr"/>
-          <a:lstStyle/>
-          <a:p>
-            <a:pPr algn="ctr"/>
-            <a:r>
-              <a:rPr lang="en-US" sz="1600" i="1" dirty="0">
-                <a:latin typeface="Book Antiqua" panose="02040602050305030304" pitchFamily="18" charset="0"/>
-              </a:rPr>
-              <a:t>l</a:t>
-            </a:r>
-          </a:p>
-        </p:txBody>
-      </p:sp>
-      <p:sp>
-        <p:nvSpPr>
-          <p:cNvPr id="95" name="Rectangle 94"/>
-          <p:cNvSpPr/>
-          <p:nvPr/>
-        </p:nvSpPr>
-        <p:spPr>
-          <a:xfrm>
-            <a:off x="4951421" y="1156330"/>
-            <a:ext cx="519154" cy="360040"/>
-          </a:xfrm>
-          <a:prstGeom prst="rect">
-            <a:avLst/>
-          </a:prstGeom>
-          <a:noFill/>
-          <a:ln>
-            <a:noFill/>
-          </a:ln>
-        </p:spPr>
-        <p:style>
-          <a:lnRef idx="2">
-            <a:schemeClr val="dk1"/>
-          </a:lnRef>
-          <a:fillRef idx="1">
-            <a:schemeClr val="lt1"/>
-          </a:fillRef>
-          <a:effectRef idx="0">
-            <a:schemeClr val="dk1"/>
-          </a:effectRef>
-          <a:fontRef idx="minor">
-            <a:schemeClr val="dk1"/>
-          </a:fontRef>
-        </p:style>
-        <p:txBody>
-          <a:bodyPr rtlCol="0" anchor="ctr"/>
-          <a:lstStyle/>
-          <a:p>
-            <a:pPr algn="ctr"/>
-            <a:r>
-              <a:rPr lang="en-US" i="1" dirty="0">
-                <a:latin typeface="Book Antiqua" panose="02040602050305030304" pitchFamily="18" charset="0"/>
-              </a:rPr>
-              <a:t>s</a:t>
-            </a:r>
-          </a:p>
-        </p:txBody>
-      </p:sp>
-      <p:sp>
-        <p:nvSpPr>
-          <p:cNvPr id="96" name="Rectangle 95"/>
-          <p:cNvSpPr/>
-          <p:nvPr/>
-        </p:nvSpPr>
-        <p:spPr>
-          <a:xfrm>
-            <a:off x="2971201" y="1156330"/>
-            <a:ext cx="519154" cy="360040"/>
-          </a:xfrm>
-          <a:prstGeom prst="rect">
-            <a:avLst/>
-          </a:prstGeom>
-          <a:noFill/>
-          <a:ln>
-            <a:noFill/>
-          </a:ln>
-        </p:spPr>
-        <p:style>
-          <a:lnRef idx="2">
-            <a:schemeClr val="dk1"/>
-          </a:lnRef>
-          <a:fillRef idx="1">
-            <a:schemeClr val="lt1"/>
-          </a:fillRef>
-          <a:effectRef idx="0">
-            <a:schemeClr val="dk1"/>
-          </a:effectRef>
-          <a:fontRef idx="minor">
-            <a:schemeClr val="dk1"/>
-          </a:fontRef>
-        </p:style>
-        <p:txBody>
-          <a:bodyPr rtlCol="0" anchor="ctr"/>
-          <a:lstStyle/>
-          <a:p>
-            <a:pPr algn="ctr"/>
-            <a:r>
-              <a:rPr lang="en-US" i="1" dirty="0">
-                <a:latin typeface="Book Antiqua" panose="02040602050305030304" pitchFamily="18" charset="0"/>
-              </a:rPr>
-              <a:t>s</a:t>
-            </a:r>
-          </a:p>
-        </p:txBody>
-      </p:sp>
-      <p:sp>
-        <p:nvSpPr>
-          <p:cNvPr id="97" name="Rectangle 96"/>
-          <p:cNvSpPr/>
-          <p:nvPr/>
-        </p:nvSpPr>
-        <p:spPr>
-          <a:xfrm>
-            <a:off x="6948264" y="1156330"/>
-            <a:ext cx="519154" cy="360040"/>
-          </a:xfrm>
-          <a:prstGeom prst="rect">
-            <a:avLst/>
-          </a:prstGeom>
-          <a:noFill/>
-          <a:ln>
-            <a:noFill/>
-          </a:ln>
-        </p:spPr>
-        <p:style>
-          <a:lnRef idx="2">
-            <a:schemeClr val="dk1"/>
-          </a:lnRef>
-          <a:fillRef idx="1">
-            <a:schemeClr val="lt1"/>
-          </a:fillRef>
-          <a:effectRef idx="0">
-            <a:schemeClr val="dk1"/>
-          </a:effectRef>
-          <a:fontRef idx="minor">
-            <a:schemeClr val="dk1"/>
-          </a:fontRef>
-        </p:style>
-        <p:txBody>
-          <a:bodyPr rtlCol="0" anchor="ctr"/>
-          <a:lstStyle/>
-          <a:p>
-            <a:pPr algn="ctr"/>
-            <a:r>
-              <a:rPr lang="en-US" i="1" dirty="0">
-                <a:latin typeface="Book Antiqua" panose="02040602050305030304" pitchFamily="18" charset="0"/>
-              </a:rPr>
-              <a:t>s</a:t>
-            </a:r>
-          </a:p>
-        </p:txBody>
-      </p:sp>
-      <p:cxnSp>
-        <p:nvCxnSpPr>
-          <p:cNvPr id="98" name="Straight Arrow Connector 97" title="dsfsdf"/>
-          <p:cNvCxnSpPr/>
-          <p:nvPr/>
-        </p:nvCxnSpPr>
-        <p:spPr>
-          <a:xfrm>
-            <a:off x="1851737" y="692696"/>
-            <a:ext cx="6624736" cy="0"/>
-          </a:xfrm>
-          <a:prstGeom prst="straightConnector1">
-            <a:avLst/>
-          </a:prstGeom>
-          <a:ln w="9525">
-            <a:solidFill>
+              <a:prstDash val="sysDot"/>
+              <a:headEnd type="arrow" w="med" len="med"/>
+              <a:tailEnd type="arrow" w="med" len="med"/>
+            </a:ln>
+          </p:spPr>
+          <p:style>
+            <a:lnRef idx="1">
+              <a:schemeClr val="accent1"/>
+            </a:lnRef>
+            <a:fillRef idx="0">
+              <a:schemeClr val="accent1"/>
+            </a:fillRef>
+            <a:effectRef idx="0">
+              <a:schemeClr val="accent1"/>
+            </a:effectRef>
+            <a:fontRef idx="minor">
               <a:schemeClr val="tx1"/>
-            </a:solidFill>
-            <a:prstDash val="sysDot"/>
-            <a:headEnd type="arrow" w="med" len="med"/>
-            <a:tailEnd type="arrow" w="med" len="med"/>
-          </a:ln>
-        </p:spPr>
-        <p:style>
-          <a:lnRef idx="1">
-            <a:schemeClr val="accent1"/>
-          </a:lnRef>
-          <a:fillRef idx="0">
-            <a:schemeClr val="accent1"/>
-          </a:fillRef>
-          <a:effectRef idx="0">
-            <a:schemeClr val="accent1"/>
-          </a:effectRef>
-          <a:fontRef idx="minor">
-            <a:schemeClr val="tx1"/>
-          </a:fontRef>
-        </p:style>
-      </p:cxnSp>
-      <p:sp>
-        <p:nvSpPr>
-          <p:cNvPr id="100" name="Rectangle 99"/>
-          <p:cNvSpPr/>
-          <p:nvPr/>
-        </p:nvSpPr>
-        <p:spPr>
-          <a:xfrm>
-            <a:off x="4758654" y="546632"/>
-            <a:ext cx="517145" cy="299286"/>
-          </a:xfrm>
-          <a:prstGeom prst="rect">
-            <a:avLst/>
-          </a:prstGeom>
-          <a:solidFill>
-            <a:schemeClr val="bg1"/>
-          </a:solidFill>
-          <a:ln w="9525">
+            </a:fontRef>
+          </p:style>
+        </p:cxnSp>
+        <p:sp>
+          <p:nvSpPr>
+            <p:cNvPr id="100" name="Rectangle 99"/>
+            <p:cNvSpPr/>
+            <p:nvPr/>
+          </p:nvSpPr>
+          <p:spPr>
+            <a:xfrm>
+              <a:off x="4758654" y="546632"/>
+              <a:ext cx="517145" cy="299286"/>
+            </a:xfrm>
+            <a:prstGeom prst="rect">
+              <a:avLst/>
+            </a:prstGeom>
             <a:solidFill>
               <a:schemeClr val="bg1"/>
             </a:solidFill>
-            <a:prstDash val="sysDot"/>
-          </a:ln>
-        </p:spPr>
-        <p:style>
-          <a:lnRef idx="2">
-            <a:schemeClr val="accent1">
-              <a:shade val="50000"/>
-            </a:schemeClr>
-          </a:lnRef>
-          <a:fillRef idx="1">
-            <a:schemeClr val="accent1"/>
-          </a:fillRef>
-          <a:effectRef idx="0">
-            <a:schemeClr val="accent1"/>
-          </a:effectRef>
-          <a:fontRef idx="minor">
-            <a:schemeClr val="lt1"/>
-          </a:fontRef>
-        </p:style>
-        <p:txBody>
-          <a:bodyPr rtlCol="0" anchor="ctr"/>
-          <a:lstStyle/>
-          <a:p>
-            <a:pPr algn="ctr"/>
-            <a:r>
-              <a:rPr lang="en-US" sz="2000" i="1" dirty="0">
-                <a:solidFill>
-                  <a:schemeClr val="tx1"/>
-                </a:solidFill>
-                <a:latin typeface="Book Antiqua" panose="02040602050305030304" pitchFamily="18" charset="0"/>
-              </a:rPr>
-              <a:t>L</a:t>
-            </a:r>
-          </a:p>
-        </p:txBody>
-      </p:sp>
-      <p:cxnSp>
-        <p:nvCxnSpPr>
-          <p:cNvPr id="101" name="Straight Connector 100"/>
-          <p:cNvCxnSpPr/>
-          <p:nvPr/>
-        </p:nvCxnSpPr>
-        <p:spPr>
-          <a:xfrm>
-            <a:off x="1835696" y="424689"/>
-            <a:ext cx="0" cy="731641"/>
-          </a:xfrm>
-          <a:prstGeom prst="line">
-            <a:avLst/>
-          </a:prstGeom>
-        </p:spPr>
-        <p:style>
-          <a:lnRef idx="1">
-            <a:schemeClr val="accent1"/>
-          </a:lnRef>
-          <a:fillRef idx="0">
-            <a:schemeClr val="accent1"/>
-          </a:fillRef>
-          <a:effectRef idx="0">
-            <a:schemeClr val="accent1"/>
-          </a:effectRef>
-          <a:fontRef idx="minor">
-            <a:schemeClr val="tx1"/>
-          </a:fontRef>
-        </p:style>
-      </p:cxnSp>
-      <p:cxnSp>
-        <p:nvCxnSpPr>
-          <p:cNvPr id="102" name="Straight Connector 101"/>
-          <p:cNvCxnSpPr/>
-          <p:nvPr/>
-        </p:nvCxnSpPr>
-        <p:spPr>
-          <a:xfrm>
-            <a:off x="8532440" y="424689"/>
-            <a:ext cx="0" cy="731641"/>
-          </a:xfrm>
-          <a:prstGeom prst="line">
-            <a:avLst/>
-          </a:prstGeom>
-        </p:spPr>
-        <p:style>
-          <a:lnRef idx="1">
-            <a:schemeClr val="accent1"/>
-          </a:lnRef>
-          <a:fillRef idx="0">
-            <a:schemeClr val="accent1"/>
-          </a:fillRef>
-          <a:effectRef idx="0">
-            <a:schemeClr val="accent1"/>
-          </a:effectRef>
-          <a:fontRef idx="minor">
-            <a:schemeClr val="tx1"/>
-          </a:fontRef>
-        </p:style>
-      </p:cxnSp>
+            <a:ln w="9525">
+              <a:solidFill>
+                <a:schemeClr val="bg1"/>
+              </a:solidFill>
+              <a:prstDash val="sysDot"/>
+            </a:ln>
+          </p:spPr>
+          <p:style>
+            <a:lnRef idx="2">
+              <a:schemeClr val="accent1">
+                <a:shade val="50000"/>
+              </a:schemeClr>
+            </a:lnRef>
+            <a:fillRef idx="1">
+              <a:schemeClr val="accent1"/>
+            </a:fillRef>
+            <a:effectRef idx="0">
+              <a:schemeClr val="accent1"/>
+            </a:effectRef>
+            <a:fontRef idx="minor">
+              <a:schemeClr val="lt1"/>
+            </a:fontRef>
+          </p:style>
+          <p:txBody>
+            <a:bodyPr rtlCol="0" anchor="ctr"/>
+            <a:lstStyle/>
+            <a:p>
+              <a:pPr algn="ctr"/>
+              <a:r>
+                <a:rPr lang="en-US" sz="2000" i="1" dirty="0">
+                  <a:solidFill>
+                    <a:schemeClr val="tx1"/>
+                  </a:solidFill>
+                  <a:latin typeface="Book Antiqua" panose="02040602050305030304" pitchFamily="18" charset="0"/>
+                </a:rPr>
+                <a:t>L</a:t>
+              </a:r>
+            </a:p>
+          </p:txBody>
+        </p:sp>
+        <p:cxnSp>
+          <p:nvCxnSpPr>
+            <p:cNvPr id="101" name="Straight Connector 100"/>
+            <p:cNvCxnSpPr/>
+            <p:nvPr/>
+          </p:nvCxnSpPr>
+          <p:spPr>
+            <a:xfrm>
+              <a:off x="1835696" y="424689"/>
+              <a:ext cx="0" cy="731641"/>
+            </a:xfrm>
+            <a:prstGeom prst="line">
+              <a:avLst/>
+            </a:prstGeom>
+          </p:spPr>
+          <p:style>
+            <a:lnRef idx="1">
+              <a:schemeClr val="accent1"/>
+            </a:lnRef>
+            <a:fillRef idx="0">
+              <a:schemeClr val="accent1"/>
+            </a:fillRef>
+            <a:effectRef idx="0">
+              <a:schemeClr val="accent1"/>
+            </a:effectRef>
+            <a:fontRef idx="minor">
+              <a:schemeClr val="tx1"/>
+            </a:fontRef>
+          </p:style>
+        </p:cxnSp>
+        <p:cxnSp>
+          <p:nvCxnSpPr>
+            <p:cNvPr id="102" name="Straight Connector 101"/>
+            <p:cNvCxnSpPr/>
+            <p:nvPr/>
+          </p:nvCxnSpPr>
+          <p:spPr>
+            <a:xfrm>
+              <a:off x="8532440" y="424689"/>
+              <a:ext cx="0" cy="731641"/>
+            </a:xfrm>
+            <a:prstGeom prst="line">
+              <a:avLst/>
+            </a:prstGeom>
+          </p:spPr>
+          <p:style>
+            <a:lnRef idx="1">
+              <a:schemeClr val="accent1"/>
+            </a:lnRef>
+            <a:fillRef idx="0">
+              <a:schemeClr val="accent1"/>
+            </a:fillRef>
+            <a:effectRef idx="0">
+              <a:schemeClr val="accent1"/>
+            </a:effectRef>
+            <a:fontRef idx="minor">
+              <a:schemeClr val="tx1"/>
+            </a:fontRef>
+          </p:style>
+        </p:cxnSp>
+      </p:grpSp>
     </p:spTree>
     <p:extLst>
       <p:ext uri="{BB962C8B-B14F-4D97-AF65-F5344CB8AC3E}">

</xml_diff>